<commit_message>
Updated UI and ppt presentation
</commit_message>
<xml_diff>
--- a/Hackathon Shadi Christina.pptx
+++ b/Hackathon Shadi Christina.pptx
@@ -5,7 +5,7 @@
     <p:sldMasterId id="2147483660" r:id="rId1"/>
   </p:sldMasterIdLst>
   <p:notesMasterIdLst>
-    <p:notesMasterId r:id="rId13"/>
+    <p:notesMasterId r:id="rId16"/>
   </p:notesMasterIdLst>
   <p:sldIdLst>
     <p:sldId id="265" r:id="rId2"/>
@@ -16,9 +16,12 @@
     <p:sldId id="258" r:id="rId7"/>
     <p:sldId id="271" r:id="rId8"/>
     <p:sldId id="272" r:id="rId9"/>
-    <p:sldId id="274" r:id="rId10"/>
-    <p:sldId id="273" r:id="rId11"/>
-    <p:sldId id="275" r:id="rId12"/>
+    <p:sldId id="276" r:id="rId10"/>
+    <p:sldId id="274" r:id="rId11"/>
+    <p:sldId id="273" r:id="rId12"/>
+    <p:sldId id="277" r:id="rId13"/>
+    <p:sldId id="278" r:id="rId14"/>
+    <p:sldId id="279" r:id="rId15"/>
   </p:sldIdLst>
   <p:sldSz cx="12192000" cy="6858000"/>
   <p:notesSz cx="6858000" cy="9144000"/>
@@ -1105,7 +1108,7 @@
         <a:p>
           <a:r>
             <a:rPr lang="en-US" dirty="0"/>
-            <a:t>The purpose was to demonstrate that voice command are possible</a:t>
+            <a:t>The purpose was to demonstrate that voice command are possible (proof of concept)</a:t>
           </a:r>
         </a:p>
       </dgm:t>
@@ -1668,7 +1671,7 @@
           </a:pPr>
           <a:r>
             <a:rPr lang="en-US" sz="2500" kern="1200" dirty="0"/>
-            <a:t>The purpose was to demonstrate that voice command are possible</a:t>
+            <a:t>The purpose was to demonstrate that voice command are possible (proof of concept)</a:t>
           </a:r>
         </a:p>
       </dsp:txBody>
@@ -3241,7 +3244,7 @@
           <a:p>
             <a:fld id="{DFDFCA8A-0512-43AB-803D-D45DB50FBC7E}" type="datetimeFigureOut">
               <a:rPr lang="en-US" smtClean="0"/>
-              <a:t>2021-09-04</a:t>
+              <a:t>2021-09-05</a:t>
             </a:fld>
             <a:endParaRPr lang="en-US"/>
           </a:p>
@@ -3552,27 +3555,7 @@
           <a:bodyPr/>
           <a:lstStyle/>
           <a:p>
-            <a:pPr marL="0" marR="0" lvl="0" indent="0" algn="l" defTabSz="914400" rtl="0" eaLnBrk="1" fontAlgn="auto" latinLnBrk="0" hangingPunct="1">
-              <a:lnSpc>
-                <a:spcPct val="100000"/>
-              </a:lnSpc>
-              <a:spcBef>
-                <a:spcPts val="0"/>
-              </a:spcBef>
-              <a:spcAft>
-                <a:spcPts val="0"/>
-              </a:spcAft>
-              <a:buClrTx/>
-              <a:buSzTx/>
-              <a:buFontTx/>
-              <a:buNone/>
-              <a:tabLst/>
-              <a:defRPr/>
-            </a:pPr>
-            <a:r>
-              <a:rPr lang="en-US" dirty="0"/>
-              <a:t>* Hard to find correct choice API for text-to-speech</a:t>
-            </a:r>
+            <a:endParaRPr lang="en-US" dirty="0"/>
           </a:p>
         </p:txBody>
       </p:sp>
@@ -3593,7 +3576,7 @@
           <a:p>
             <a:fld id="{64466C76-0BFA-4C3A-8B74-37E61261B65A}" type="slidenum">
               <a:rPr lang="en-US" smtClean="0"/>
-              <a:t>9</a:t>
+              <a:t>6</a:t>
             </a:fld>
             <a:endParaRPr lang="en-US"/>
           </a:p>
@@ -3602,7 +3585,7 @@
     </p:spTree>
     <p:extLst>
       <p:ext uri="{BB962C8B-B14F-4D97-AF65-F5344CB8AC3E}">
-        <p14:creationId xmlns:p14="http://schemas.microsoft.com/office/powerpoint/2010/main" val="646747683"/>
+        <p14:creationId xmlns:p14="http://schemas.microsoft.com/office/powerpoint/2010/main" val="1029759099"/>
       </p:ext>
     </p:extLst>
   </p:cSld>
@@ -3675,15 +3658,90 @@
             </a:pPr>
             <a:r>
               <a:rPr lang="en-US" dirty="0"/>
-              <a:t>* it was really hard to design a full extendable and maintainable system that would work on any application.</a:t>
-            </a:r>
-          </a:p>
-          <a:p>
-            <a:r>
-              <a:rPr lang="en-US" dirty="0"/>
-              <a:t>*</a:t>
-            </a:r>
-          </a:p>
+              <a:t>* Hard to find correct choice API for text-to-speech</a:t>
+            </a:r>
+          </a:p>
+        </p:txBody>
+      </p:sp>
+      <p:sp>
+        <p:nvSpPr>
+          <p:cNvPr id="4" name="Slide Number Placeholder 3"/>
+          <p:cNvSpPr>
+            <a:spLocks noGrp="1"/>
+          </p:cNvSpPr>
+          <p:nvPr>
+            <p:ph type="sldNum" sz="quarter" idx="5"/>
+          </p:nvPr>
+        </p:nvSpPr>
+        <p:spPr/>
+        <p:txBody>
+          <a:bodyPr/>
+          <a:lstStyle/>
+          <a:p>
+            <a:fld id="{64466C76-0BFA-4C3A-8B74-37E61261B65A}" type="slidenum">
+              <a:rPr lang="en-US" smtClean="0"/>
+              <a:t>10</a:t>
+            </a:fld>
+            <a:endParaRPr lang="en-US"/>
+          </a:p>
+        </p:txBody>
+      </p:sp>
+    </p:spTree>
+    <p:extLst>
+      <p:ext uri="{BB962C8B-B14F-4D97-AF65-F5344CB8AC3E}">
+        <p14:creationId xmlns:p14="http://schemas.microsoft.com/office/powerpoint/2010/main" val="646747683"/>
+      </p:ext>
+    </p:extLst>
+  </p:cSld>
+  <p:clrMapOvr>
+    <a:masterClrMapping/>
+  </p:clrMapOvr>
+</p:notes>
+</file>
+
+<file path=ppt/notesSlides/notesSlide3.xml><?xml version="1.0" encoding="utf-8"?>
+<p:notes xmlns:a="http://schemas.openxmlformats.org/drawingml/2006/main" xmlns:r="http://schemas.openxmlformats.org/officeDocument/2006/relationships" xmlns:p="http://schemas.openxmlformats.org/presentationml/2006/main">
+  <p:cSld>
+    <p:spTree>
+      <p:nvGrpSpPr>
+        <p:cNvPr id="1" name=""/>
+        <p:cNvGrpSpPr/>
+        <p:nvPr/>
+      </p:nvGrpSpPr>
+      <p:grpSpPr>
+        <a:xfrm>
+          <a:off x="0" y="0"/>
+          <a:ext cx="0" cy="0"/>
+          <a:chOff x="0" y="0"/>
+          <a:chExt cx="0" cy="0"/>
+        </a:xfrm>
+      </p:grpSpPr>
+      <p:sp>
+        <p:nvSpPr>
+          <p:cNvPr id="2" name="Slide Image Placeholder 1"/>
+          <p:cNvSpPr>
+            <a:spLocks noGrp="1" noRot="1" noChangeAspect="1"/>
+          </p:cNvSpPr>
+          <p:nvPr>
+            <p:ph type="sldImg"/>
+          </p:nvPr>
+        </p:nvSpPr>
+        <p:spPr/>
+      </p:sp>
+      <p:sp>
+        <p:nvSpPr>
+          <p:cNvPr id="3" name="Notes Placeholder 2"/>
+          <p:cNvSpPr>
+            <a:spLocks noGrp="1"/>
+          </p:cNvSpPr>
+          <p:nvPr>
+            <p:ph type="body" idx="1"/>
+          </p:nvPr>
+        </p:nvSpPr>
+        <p:spPr/>
+        <p:txBody>
+          <a:bodyPr/>
+          <a:lstStyle/>
           <a:p>
             <a:pPr marL="0" marR="0" lvl="0" indent="0" algn="l" defTabSz="914400" rtl="0" eaLnBrk="1" fontAlgn="auto" latinLnBrk="0" hangingPunct="1">
               <a:lnSpc>
@@ -3704,6 +3762,35 @@
             </a:pPr>
             <a:r>
               <a:rPr lang="en-US" dirty="0"/>
+              <a:t>* it was really hard to design a full extendable and maintainable system that would work on any application.</a:t>
+            </a:r>
+          </a:p>
+          <a:p>
+            <a:r>
+              <a:rPr lang="en-US" dirty="0"/>
+              <a:t>*</a:t>
+            </a:r>
+          </a:p>
+          <a:p>
+            <a:pPr marL="0" marR="0" lvl="0" indent="0" algn="l" defTabSz="914400" rtl="0" eaLnBrk="1" fontAlgn="auto" latinLnBrk="0" hangingPunct="1">
+              <a:lnSpc>
+                <a:spcPct val="100000"/>
+              </a:lnSpc>
+              <a:spcBef>
+                <a:spcPts val="0"/>
+              </a:spcBef>
+              <a:spcAft>
+                <a:spcPts val="0"/>
+              </a:spcAft>
+              <a:buClrTx/>
+              <a:buSzTx/>
+              <a:buFontTx/>
+              <a:buNone/>
+              <a:tabLst/>
+              <a:defRPr/>
+            </a:pPr>
+            <a:r>
+              <a:rPr lang="en-US" dirty="0"/>
               <a:t>* It is easy to refactor the code to use some sort of Callback system. Which allows each application to define </a:t>
             </a:r>
           </a:p>
@@ -3729,7 +3816,7 @@
           <a:p>
             <a:fld id="{64466C76-0BFA-4C3A-8B74-37E61261B65A}" type="slidenum">
               <a:rPr lang="en-US" smtClean="0"/>
-              <a:t>10</a:t>
+              <a:t>11</a:t>
             </a:fld>
             <a:endParaRPr lang="en-US"/>
           </a:p>
@@ -3934,7 +4021,7 @@
           <a:p>
             <a:fld id="{4E5078B9-44E3-4429-96BC-EA075EF29453}" type="datetimeFigureOut">
               <a:rPr lang="en-CA" smtClean="0"/>
-              <a:t>2021-09-04</a:t>
+              <a:t>2021-09-05</a:t>
             </a:fld>
             <a:endParaRPr lang="en-CA"/>
           </a:p>
@@ -4209,7 +4296,7 @@
           <a:p>
             <a:fld id="{4E5078B9-44E3-4429-96BC-EA075EF29453}" type="datetimeFigureOut">
               <a:rPr lang="en-CA" smtClean="0"/>
-              <a:t>2021-09-04</a:t>
+              <a:t>2021-09-05</a:t>
             </a:fld>
             <a:endParaRPr lang="en-CA"/>
           </a:p>
@@ -4403,7 +4490,7 @@
           <a:p>
             <a:fld id="{4E5078B9-44E3-4429-96BC-EA075EF29453}" type="datetimeFigureOut">
               <a:rPr lang="en-CA" smtClean="0"/>
-              <a:t>2021-09-04</a:t>
+              <a:t>2021-09-05</a:t>
             </a:fld>
             <a:endParaRPr lang="en-CA"/>
           </a:p>
@@ -4676,7 +4763,7 @@
           <a:p>
             <a:fld id="{4E5078B9-44E3-4429-96BC-EA075EF29453}" type="datetimeFigureOut">
               <a:rPr lang="en-CA" smtClean="0"/>
-              <a:t>2021-09-04</a:t>
+              <a:t>2021-09-05</a:t>
             </a:fld>
             <a:endParaRPr lang="en-CA"/>
           </a:p>
@@ -5017,7 +5104,7 @@
           <a:p>
             <a:fld id="{4E5078B9-44E3-4429-96BC-EA075EF29453}" type="datetimeFigureOut">
               <a:rPr lang="en-CA" smtClean="0"/>
-              <a:t>2021-09-04</a:t>
+              <a:t>2021-09-05</a:t>
             </a:fld>
             <a:endParaRPr lang="en-CA"/>
           </a:p>
@@ -5640,7 +5727,7 @@
           <a:p>
             <a:fld id="{4E5078B9-44E3-4429-96BC-EA075EF29453}" type="datetimeFigureOut">
               <a:rPr lang="en-CA" smtClean="0"/>
-              <a:t>2021-09-04</a:t>
+              <a:t>2021-09-05</a:t>
             </a:fld>
             <a:endParaRPr lang="en-CA"/>
           </a:p>
@@ -6500,7 +6587,7 @@
           <a:p>
             <a:fld id="{4E5078B9-44E3-4429-96BC-EA075EF29453}" type="datetimeFigureOut">
               <a:rPr lang="en-CA" smtClean="0"/>
-              <a:t>2021-09-04</a:t>
+              <a:t>2021-09-05</a:t>
             </a:fld>
             <a:endParaRPr lang="en-CA"/>
           </a:p>
@@ -6670,7 +6757,7 @@
           <a:p>
             <a:fld id="{4E5078B9-44E3-4429-96BC-EA075EF29453}" type="datetimeFigureOut">
               <a:rPr lang="en-CA" smtClean="0"/>
-              <a:t>2021-09-04</a:t>
+              <a:t>2021-09-05</a:t>
             </a:fld>
             <a:endParaRPr lang="en-CA"/>
           </a:p>
@@ -6850,7 +6937,7 @@
           <a:p>
             <a:fld id="{4E5078B9-44E3-4429-96BC-EA075EF29453}" type="datetimeFigureOut">
               <a:rPr lang="en-CA" smtClean="0"/>
-              <a:t>2021-09-04</a:t>
+              <a:t>2021-09-05</a:t>
             </a:fld>
             <a:endParaRPr lang="en-CA"/>
           </a:p>
@@ -7020,7 +7107,7 @@
           <a:p>
             <a:fld id="{4E5078B9-44E3-4429-96BC-EA075EF29453}" type="datetimeFigureOut">
               <a:rPr lang="en-CA" smtClean="0"/>
-              <a:t>2021-09-04</a:t>
+              <a:t>2021-09-05</a:t>
             </a:fld>
             <a:endParaRPr lang="en-CA"/>
           </a:p>
@@ -7267,7 +7354,7 @@
           <a:p>
             <a:fld id="{4E5078B9-44E3-4429-96BC-EA075EF29453}" type="datetimeFigureOut">
               <a:rPr lang="en-CA" smtClean="0"/>
-              <a:t>2021-09-04</a:t>
+              <a:t>2021-09-05</a:t>
             </a:fld>
             <a:endParaRPr lang="en-CA"/>
           </a:p>
@@ -7559,7 +7646,7 @@
           <a:p>
             <a:fld id="{4E5078B9-44E3-4429-96BC-EA075EF29453}" type="datetimeFigureOut">
               <a:rPr lang="en-CA" smtClean="0"/>
-              <a:t>2021-09-04</a:t>
+              <a:t>2021-09-05</a:t>
             </a:fld>
             <a:endParaRPr lang="en-CA"/>
           </a:p>
@@ -8003,7 +8090,7 @@
           <a:p>
             <a:fld id="{4E5078B9-44E3-4429-96BC-EA075EF29453}" type="datetimeFigureOut">
               <a:rPr lang="en-CA" smtClean="0"/>
-              <a:t>2021-09-04</a:t>
+              <a:t>2021-09-05</a:t>
             </a:fld>
             <a:endParaRPr lang="en-CA"/>
           </a:p>
@@ -8121,7 +8208,7 @@
           <a:p>
             <a:fld id="{4E5078B9-44E3-4429-96BC-EA075EF29453}" type="datetimeFigureOut">
               <a:rPr lang="en-CA" smtClean="0"/>
-              <a:t>2021-09-04</a:t>
+              <a:t>2021-09-05</a:t>
             </a:fld>
             <a:endParaRPr lang="en-CA"/>
           </a:p>
@@ -8216,7 +8303,7 @@
           <a:p>
             <a:fld id="{4E5078B9-44E3-4429-96BC-EA075EF29453}" type="datetimeFigureOut">
               <a:rPr lang="en-CA" smtClean="0"/>
-              <a:t>2021-09-04</a:t>
+              <a:t>2021-09-05</a:t>
             </a:fld>
             <a:endParaRPr lang="en-CA"/>
           </a:p>
@@ -8495,7 +8582,7 @@
           <a:p>
             <a:fld id="{4E5078B9-44E3-4429-96BC-EA075EF29453}" type="datetimeFigureOut">
               <a:rPr lang="en-CA" smtClean="0"/>
-              <a:t>2021-09-04</a:t>
+              <a:t>2021-09-05</a:t>
             </a:fld>
             <a:endParaRPr lang="en-CA"/>
           </a:p>
@@ -8770,7 +8857,7 @@
           <a:p>
             <a:fld id="{4E5078B9-44E3-4429-96BC-EA075EF29453}" type="datetimeFigureOut">
               <a:rPr lang="en-CA" smtClean="0"/>
-              <a:t>2021-09-04</a:t>
+              <a:t>2021-09-05</a:t>
             </a:fld>
             <a:endParaRPr lang="en-CA"/>
           </a:p>
@@ -9199,7 +9286,7 @@
           <a:p>
             <a:fld id="{4E5078B9-44E3-4429-96BC-EA075EF29453}" type="datetimeFigureOut">
               <a:rPr lang="en-CA" smtClean="0"/>
-              <a:t>2021-09-04</a:t>
+              <a:t>2021-09-05</a:t>
             </a:fld>
             <a:endParaRPr lang="en-CA"/>
           </a:p>
@@ -9713,6 +9800,30 @@
 <file path=ppt/slides/slide1.xml><?xml version="1.0" encoding="utf-8"?>
 <p:sld xmlns:a="http://schemas.openxmlformats.org/drawingml/2006/main" xmlns:r="http://schemas.openxmlformats.org/officeDocument/2006/relationships" xmlns:p="http://schemas.openxmlformats.org/presentationml/2006/main">
   <p:cSld>
+    <p:bg>
+      <p:bgPr>
+        <a:blipFill rotWithShape="1">
+          <a:blip r:embed="rId2">
+            <a:duotone>
+              <a:schemeClr val="bg2">
+                <a:shade val="69000"/>
+                <a:hueMod val="108000"/>
+                <a:satMod val="164000"/>
+                <a:lumMod val="74000"/>
+              </a:schemeClr>
+              <a:schemeClr val="bg2">
+                <a:tint val="96000"/>
+                <a:hueMod val="88000"/>
+                <a:satMod val="140000"/>
+                <a:lumMod val="132000"/>
+              </a:schemeClr>
+            </a:duotone>
+          </a:blip>
+          <a:stretch/>
+        </a:blipFill>
+        <a:effectLst/>
+      </p:bgPr>
+    </p:bg>
     <p:spTree>
       <p:nvGrpSpPr>
         <p:cNvPr id="1" name=""/>
@@ -9727,6 +9838,608 @@
           <a:chExt cx="0" cy="0"/>
         </a:xfrm>
       </p:grpSpPr>
+      <p:pic>
+        <p:nvPicPr>
+          <p:cNvPr id="10" name="Picture 9">
+            <a:extLst>
+              <a:ext uri="{FF2B5EF4-FFF2-40B4-BE49-F238E27FC236}">
+                <a16:creationId xmlns:a16="http://schemas.microsoft.com/office/drawing/2014/main" id="{91B28F63-CF00-448F-B141-FE33C33B1891}"/>
+              </a:ext>
+              <a:ext uri="{C183D7F6-B498-43B3-948B-1728B52AA6E4}">
+                <adec:decorative xmlns:adec="http://schemas.microsoft.com/office/drawing/2017/decorative" val="1"/>
+              </a:ext>
+            </a:extLst>
+          </p:cNvPr>
+          <p:cNvPicPr>
+            <a:picLocks noGrp="1" noRot="1" noChangeAspect="1" noMove="1" noResize="1" noEditPoints="1" noAdjustHandles="1" noChangeArrowheads="1" noChangeShapeType="1" noCrop="1"/>
+          </p:cNvPicPr>
+          <p:nvPr>
+            <p:extLst>
+              <p:ext uri="{386F3935-93C4-4BCD-93E2-E3B085C9AB24}">
+                <p16:designElem xmlns:p16="http://schemas.microsoft.com/office/powerpoint/2015/main" val="1"/>
+              </p:ext>
+            </p:extLst>
+          </p:nvPr>
+        </p:nvPicPr>
+        <p:blipFill rotWithShape="1">
+          <a:blip r:embed="rId3">
+            <a:extLst>
+              <a:ext uri="{28A0092B-C50C-407E-A947-70E740481C1C}">
+                <a14:useLocalDpi xmlns:a14="http://schemas.microsoft.com/office/drawing/2010/main" val="0"/>
+              </a:ext>
+            </a:extLst>
+          </a:blip>
+          <a:srcRect l="3613"/>
+          <a:stretch/>
+        </p:blipFill>
+        <p:spPr>
+          <a:xfrm>
+            <a:off x="0" y="2669685"/>
+            <a:ext cx="4037012" cy="4188315"/>
+          </a:xfrm>
+          <a:prstGeom prst="rect">
+            <a:avLst/>
+          </a:prstGeom>
+        </p:spPr>
+      </p:pic>
+      <p:pic>
+        <p:nvPicPr>
+          <p:cNvPr id="12" name="Picture 11">
+            <a:extLst>
+              <a:ext uri="{FF2B5EF4-FFF2-40B4-BE49-F238E27FC236}">
+                <a16:creationId xmlns:a16="http://schemas.microsoft.com/office/drawing/2014/main" id="{2AE609E2-8522-44E4-9077-980E5BCF3E14}"/>
+              </a:ext>
+              <a:ext uri="{C183D7F6-B498-43B3-948B-1728B52AA6E4}">
+                <adec:decorative xmlns:adec="http://schemas.microsoft.com/office/drawing/2017/decorative" val="1"/>
+              </a:ext>
+            </a:extLst>
+          </p:cNvPr>
+          <p:cNvPicPr>
+            <a:picLocks noGrp="1" noRot="1" noChangeAspect="1" noMove="1" noResize="1" noEditPoints="1" noAdjustHandles="1" noChangeArrowheads="1" noChangeShapeType="1" noCrop="1"/>
+          </p:cNvPicPr>
+          <p:nvPr>
+            <p:extLst>
+              <p:ext uri="{386F3935-93C4-4BCD-93E2-E3B085C9AB24}">
+                <p16:designElem xmlns:p16="http://schemas.microsoft.com/office/powerpoint/2015/main" val="1"/>
+              </p:ext>
+            </p:extLst>
+          </p:nvPr>
+        </p:nvPicPr>
+        <p:blipFill rotWithShape="1">
+          <a:blip r:embed="rId4">
+            <a:extLst>
+              <a:ext uri="{28A0092B-C50C-407E-A947-70E740481C1C}">
+                <a14:useLocalDpi xmlns:a14="http://schemas.microsoft.com/office/drawing/2010/main" val="0"/>
+              </a:ext>
+            </a:extLst>
+          </a:blip>
+          <a:srcRect l="35640"/>
+          <a:stretch/>
+        </p:blipFill>
+        <p:spPr>
+          <a:xfrm>
+            <a:off x="0" y="2892347"/>
+            <a:ext cx="1522412" cy="2365453"/>
+          </a:xfrm>
+          <a:prstGeom prst="rect">
+            <a:avLst/>
+          </a:prstGeom>
+        </p:spPr>
+      </p:pic>
+      <p:sp>
+        <p:nvSpPr>
+          <p:cNvPr id="14" name="Oval 13">
+            <a:extLst>
+              <a:ext uri="{FF2B5EF4-FFF2-40B4-BE49-F238E27FC236}">
+                <a16:creationId xmlns:a16="http://schemas.microsoft.com/office/drawing/2014/main" id="{4FA533C5-33E3-4611-AF9F-72811D8B26A6}"/>
+              </a:ext>
+              <a:ext uri="{C183D7F6-B498-43B3-948B-1728B52AA6E4}">
+                <adec:decorative xmlns:adec="http://schemas.microsoft.com/office/drawing/2017/decorative" val="1"/>
+              </a:ext>
+            </a:extLst>
+          </p:cNvPr>
+          <p:cNvSpPr>
+            <a:spLocks noGrp="1" noRot="1" noChangeAspect="1" noMove="1" noResize="1" noEditPoints="1" noAdjustHandles="1" noChangeArrowheads="1" noChangeShapeType="1" noTextEdit="1"/>
+          </p:cNvSpPr>
+          <p:nvPr>
+            <p:extLst>
+              <p:ext uri="{386F3935-93C4-4BCD-93E2-E3B085C9AB24}">
+                <p16:designElem xmlns:p16="http://schemas.microsoft.com/office/powerpoint/2015/main" val="1"/>
+              </p:ext>
+            </p:extLst>
+          </p:nvPr>
+        </p:nvSpPr>
+        <p:spPr>
+          <a:xfrm>
+            <a:off x="8609012" y="1676400"/>
+            <a:ext cx="2819400" cy="2819400"/>
+          </a:xfrm>
+          <a:prstGeom prst="ellipse">
+            <a:avLst/>
+          </a:prstGeom>
+          <a:gradFill flip="none" rotWithShape="1">
+            <a:gsLst>
+              <a:gs pos="0">
+                <a:schemeClr val="bg2">
+                  <a:lumMod val="60000"/>
+                  <a:lumOff val="40000"/>
+                  <a:alpha val="7000"/>
+                </a:schemeClr>
+              </a:gs>
+              <a:gs pos="69000">
+                <a:schemeClr val="bg2">
+                  <a:lumMod val="60000"/>
+                  <a:lumOff val="40000"/>
+                  <a:alpha val="0"/>
+                </a:schemeClr>
+              </a:gs>
+              <a:gs pos="36000">
+                <a:schemeClr val="bg2">
+                  <a:lumMod val="60000"/>
+                  <a:lumOff val="40000"/>
+                  <a:alpha val="6000"/>
+                </a:schemeClr>
+              </a:gs>
+            </a:gsLst>
+            <a:path path="circle">
+              <a:fillToRect l="50000" t="50000" r="50000" b="50000"/>
+            </a:path>
+            <a:tileRect/>
+          </a:gradFill>
+          <a:ln>
+            <a:noFill/>
+          </a:ln>
+          <a:effectLst/>
+        </p:spPr>
+        <p:style>
+          <a:lnRef idx="1">
+            <a:schemeClr val="accent1"/>
+          </a:lnRef>
+          <a:fillRef idx="3">
+            <a:schemeClr val="accent1"/>
+          </a:fillRef>
+          <a:effectRef idx="2">
+            <a:schemeClr val="accent1"/>
+          </a:effectRef>
+          <a:fontRef idx="minor">
+            <a:schemeClr val="lt1"/>
+          </a:fontRef>
+        </p:style>
+      </p:sp>
+      <p:pic>
+        <p:nvPicPr>
+          <p:cNvPr id="16" name="Picture 15">
+            <a:extLst>
+              <a:ext uri="{FF2B5EF4-FFF2-40B4-BE49-F238E27FC236}">
+                <a16:creationId xmlns:a16="http://schemas.microsoft.com/office/drawing/2014/main" id="{8949AD42-25FD-4C3D-9EEE-B7FEC5809988}"/>
+              </a:ext>
+              <a:ext uri="{C183D7F6-B498-43B3-948B-1728B52AA6E4}">
+                <adec:decorative xmlns:adec="http://schemas.microsoft.com/office/drawing/2017/decorative" val="1"/>
+              </a:ext>
+            </a:extLst>
+          </p:cNvPr>
+          <p:cNvPicPr>
+            <a:picLocks noGrp="1" noRot="1" noChangeAspect="1" noMove="1" noResize="1" noEditPoints="1" noAdjustHandles="1" noChangeArrowheads="1" noChangeShapeType="1" noCrop="1"/>
+          </p:cNvPicPr>
+          <p:nvPr>
+            <p:extLst>
+              <p:ext uri="{386F3935-93C4-4BCD-93E2-E3B085C9AB24}">
+                <p16:designElem xmlns:p16="http://schemas.microsoft.com/office/powerpoint/2015/main" val="1"/>
+              </p:ext>
+            </p:extLst>
+          </p:nvPr>
+        </p:nvPicPr>
+        <p:blipFill rotWithShape="1">
+          <a:blip r:embed="rId5">
+            <a:extLst>
+              <a:ext uri="{28A0092B-C50C-407E-A947-70E740481C1C}">
+                <a14:useLocalDpi xmlns:a14="http://schemas.microsoft.com/office/drawing/2010/main" val="0"/>
+              </a:ext>
+            </a:extLst>
+          </a:blip>
+          <a:srcRect t="28813"/>
+          <a:stretch/>
+        </p:blipFill>
+        <p:spPr>
+          <a:xfrm>
+            <a:off x="7999412" y="0"/>
+            <a:ext cx="1603387" cy="1141407"/>
+          </a:xfrm>
+          <a:prstGeom prst="rect">
+            <a:avLst/>
+          </a:prstGeom>
+        </p:spPr>
+      </p:pic>
+      <p:pic>
+        <p:nvPicPr>
+          <p:cNvPr id="18" name="Picture 17">
+            <a:extLst>
+              <a:ext uri="{FF2B5EF4-FFF2-40B4-BE49-F238E27FC236}">
+                <a16:creationId xmlns:a16="http://schemas.microsoft.com/office/drawing/2014/main" id="{6AC7D913-60B7-4603-881B-831DA5D3A940}"/>
+              </a:ext>
+              <a:ext uri="{C183D7F6-B498-43B3-948B-1728B52AA6E4}">
+                <adec:decorative xmlns:adec="http://schemas.microsoft.com/office/drawing/2017/decorative" val="1"/>
+              </a:ext>
+            </a:extLst>
+          </p:cNvPr>
+          <p:cNvPicPr>
+            <a:picLocks noGrp="1" noRot="1" noChangeAspect="1" noMove="1" noResize="1" noEditPoints="1" noAdjustHandles="1" noChangeArrowheads="1" noChangeShapeType="1" noCrop="1"/>
+          </p:cNvPicPr>
+          <p:nvPr>
+            <p:extLst>
+              <p:ext uri="{386F3935-93C4-4BCD-93E2-E3B085C9AB24}">
+                <p16:designElem xmlns:p16="http://schemas.microsoft.com/office/powerpoint/2015/main" val="1"/>
+              </p:ext>
+            </p:extLst>
+          </p:nvPr>
+        </p:nvPicPr>
+        <p:blipFill rotWithShape="1">
+          <a:blip r:embed="rId6">
+            <a:extLst>
+              <a:ext uri="{28A0092B-C50C-407E-A947-70E740481C1C}">
+                <a14:useLocalDpi xmlns:a14="http://schemas.microsoft.com/office/drawing/2010/main" val="0"/>
+              </a:ext>
+            </a:extLst>
+          </a:blip>
+          <a:srcRect b="23320"/>
+          <a:stretch/>
+        </p:blipFill>
+        <p:spPr>
+          <a:xfrm>
+            <a:off x="8605878" y="6096000"/>
+            <a:ext cx="993734" cy="762000"/>
+          </a:xfrm>
+          <a:prstGeom prst="rect">
+            <a:avLst/>
+          </a:prstGeom>
+        </p:spPr>
+      </p:pic>
+      <p:sp>
+        <p:nvSpPr>
+          <p:cNvPr id="20" name="Rectangle 19">
+            <a:extLst>
+              <a:ext uri="{FF2B5EF4-FFF2-40B4-BE49-F238E27FC236}">
+                <a16:creationId xmlns:a16="http://schemas.microsoft.com/office/drawing/2014/main" id="{87F0FDC4-AD8C-47D9-9131-623C98ADB0AE}"/>
+              </a:ext>
+              <a:ext uri="{C183D7F6-B498-43B3-948B-1728B52AA6E4}">
+                <adec:decorative xmlns:adec="http://schemas.microsoft.com/office/drawing/2017/decorative" val="1"/>
+              </a:ext>
+            </a:extLst>
+          </p:cNvPr>
+          <p:cNvSpPr>
+            <a:spLocks noGrp="1" noRot="1" noChangeAspect="1" noMove="1" noResize="1" noEditPoints="1" noAdjustHandles="1" noChangeArrowheads="1" noChangeShapeType="1" noTextEdit="1"/>
+          </p:cNvSpPr>
+          <p:nvPr>
+            <p:extLst>
+              <p:ext uri="{386F3935-93C4-4BCD-93E2-E3B085C9AB24}">
+                <p16:designElem xmlns:p16="http://schemas.microsoft.com/office/powerpoint/2015/main" val="1"/>
+              </p:ext>
+            </p:extLst>
+          </p:nvPr>
+        </p:nvSpPr>
+        <p:spPr>
+          <a:xfrm>
+            <a:off x="10437812" y="0"/>
+            <a:ext cx="685800" cy="1143000"/>
+          </a:xfrm>
+          <a:prstGeom prst="rect">
+            <a:avLst/>
+          </a:prstGeom>
+          <a:solidFill>
+            <a:schemeClr val="accent1"/>
+          </a:solidFill>
+          <a:ln>
+            <a:noFill/>
+          </a:ln>
+        </p:spPr>
+        <p:style>
+          <a:lnRef idx="1">
+            <a:schemeClr val="accent1"/>
+          </a:lnRef>
+          <a:fillRef idx="3">
+            <a:schemeClr val="accent1"/>
+          </a:fillRef>
+          <a:effectRef idx="2">
+            <a:schemeClr val="accent1"/>
+          </a:effectRef>
+          <a:fontRef idx="minor">
+            <a:schemeClr val="lt1"/>
+          </a:fontRef>
+        </p:style>
+      </p:sp>
+      <p:sp useBgFill="1">
+        <p:nvSpPr>
+          <p:cNvPr id="22" name="Rectangle 21">
+            <a:extLst>
+              <a:ext uri="{FF2B5EF4-FFF2-40B4-BE49-F238E27FC236}">
+                <a16:creationId xmlns:a16="http://schemas.microsoft.com/office/drawing/2014/main" id="{E6A222EB-A81E-4238-B08D-AAB1828C8E0B}"/>
+              </a:ext>
+              <a:ext uri="{C183D7F6-B498-43B3-948B-1728B52AA6E4}">
+                <adec:decorative xmlns:adec="http://schemas.microsoft.com/office/drawing/2017/decorative" val="1"/>
+              </a:ext>
+            </a:extLst>
+          </p:cNvPr>
+          <p:cNvSpPr>
+            <a:spLocks noGrp="1" noRot="1" noChangeAspect="1" noMove="1" noResize="1" noEditPoints="1" noAdjustHandles="1" noChangeArrowheads="1" noChangeShapeType="1" noTextEdit="1"/>
+          </p:cNvSpPr>
+          <p:nvPr>
+            <p:extLst>
+              <p:ext uri="{386F3935-93C4-4BCD-93E2-E3B085C9AB24}">
+                <p16:designElem xmlns:p16="http://schemas.microsoft.com/office/powerpoint/2015/main" val="1"/>
+              </p:ext>
+            </p:extLst>
+          </p:nvPr>
+        </p:nvSpPr>
+        <p:spPr>
+          <a:xfrm>
+            <a:off x="0" y="0"/>
+            <a:ext cx="12192000" cy="6858000"/>
+          </a:xfrm>
+          <a:prstGeom prst="rect">
+            <a:avLst/>
+          </a:prstGeom>
+          <a:ln>
+            <a:noFill/>
+          </a:ln>
+        </p:spPr>
+        <p:style>
+          <a:lnRef idx="2">
+            <a:schemeClr val="accent1">
+              <a:shade val="50000"/>
+            </a:schemeClr>
+          </a:lnRef>
+          <a:fillRef idx="1">
+            <a:schemeClr val="accent1"/>
+          </a:fillRef>
+          <a:effectRef idx="0">
+            <a:schemeClr val="accent1"/>
+          </a:effectRef>
+          <a:fontRef idx="minor">
+            <a:schemeClr val="lt1"/>
+          </a:fontRef>
+        </p:style>
+        <p:txBody>
+          <a:bodyPr rtlCol="0" anchor="ctr"/>
+          <a:lstStyle/>
+          <a:p>
+            <a:pPr algn="ctr"/>
+            <a:endParaRPr lang="en-US"/>
+          </a:p>
+        </p:txBody>
+      </p:sp>
+      <p:sp>
+        <p:nvSpPr>
+          <p:cNvPr id="24" name="Rectangle 23">
+            <a:extLst>
+              <a:ext uri="{FF2B5EF4-FFF2-40B4-BE49-F238E27FC236}">
+                <a16:creationId xmlns:a16="http://schemas.microsoft.com/office/drawing/2014/main" id="{E014676C-074B-475A-8346-9C901C86CB97}"/>
+              </a:ext>
+              <a:ext uri="{C183D7F6-B498-43B3-948B-1728B52AA6E4}">
+                <adec:decorative xmlns:adec="http://schemas.microsoft.com/office/drawing/2017/decorative" val="1"/>
+              </a:ext>
+            </a:extLst>
+          </p:cNvPr>
+          <p:cNvSpPr>
+            <a:spLocks noGrp="1" noRot="1" noChangeAspect="1" noMove="1" noResize="1" noEditPoints="1" noAdjustHandles="1" noChangeArrowheads="1" noChangeShapeType="1" noTextEdit="1"/>
+          </p:cNvSpPr>
+          <p:nvPr>
+            <p:extLst>
+              <p:ext uri="{386F3935-93C4-4BCD-93E2-E3B085C9AB24}">
+                <p16:designElem xmlns:p16="http://schemas.microsoft.com/office/powerpoint/2015/main" val="1"/>
+              </p:ext>
+            </p:extLst>
+          </p:nvPr>
+        </p:nvSpPr>
+        <p:spPr>
+          <a:xfrm>
+            <a:off x="10437812" y="0"/>
+            <a:ext cx="685800" cy="1143000"/>
+          </a:xfrm>
+          <a:prstGeom prst="rect">
+            <a:avLst/>
+          </a:prstGeom>
+          <a:solidFill>
+            <a:schemeClr val="accent1"/>
+          </a:solidFill>
+          <a:ln>
+            <a:noFill/>
+          </a:ln>
+        </p:spPr>
+        <p:style>
+          <a:lnRef idx="1">
+            <a:schemeClr val="accent1"/>
+          </a:lnRef>
+          <a:fillRef idx="3">
+            <a:schemeClr val="accent1"/>
+          </a:fillRef>
+          <a:effectRef idx="2">
+            <a:schemeClr val="accent1"/>
+          </a:effectRef>
+          <a:fontRef idx="minor">
+            <a:schemeClr val="lt1"/>
+          </a:fontRef>
+        </p:style>
+      </p:sp>
+      <p:cxnSp>
+        <p:nvCxnSpPr>
+          <p:cNvPr id="26" name="Straight Connector 25">
+            <a:extLst>
+              <a:ext uri="{FF2B5EF4-FFF2-40B4-BE49-F238E27FC236}">
+                <a16:creationId xmlns:a16="http://schemas.microsoft.com/office/drawing/2014/main" id="{179C4C8E-197B-4679-AE96-B5147F971C90}"/>
+              </a:ext>
+              <a:ext uri="{C183D7F6-B498-43B3-948B-1728B52AA6E4}">
+                <adec:decorative xmlns:adec="http://schemas.microsoft.com/office/drawing/2017/decorative" val="1"/>
+              </a:ext>
+            </a:extLst>
+          </p:cNvPr>
+          <p:cNvCxnSpPr>
+            <a:cxnSpLocks noGrp="1" noRot="1" noChangeAspect="1" noMove="1" noResize="1" noEditPoints="1" noAdjustHandles="1" noChangeArrowheads="1" noChangeShapeType="1"/>
+          </p:cNvCxnSpPr>
+          <p:nvPr>
+            <p:extLst>
+              <p:ext uri="{386F3935-93C4-4BCD-93E2-E3B085C9AB24}">
+                <p16:designElem xmlns:p16="http://schemas.microsoft.com/office/powerpoint/2015/main" val="1"/>
+              </p:ext>
+            </p:extLst>
+          </p:nvPr>
+        </p:nvCxnSpPr>
+        <p:spPr>
+          <a:xfrm>
+            <a:off x="4356687" y="1930986"/>
+            <a:ext cx="0" cy="3200400"/>
+          </a:xfrm>
+          <a:prstGeom prst="line">
+            <a:avLst/>
+          </a:prstGeom>
+          <a:ln w="15875" cap="sq">
+            <a:solidFill>
+              <a:schemeClr val="tx2">
+                <a:alpha val="70000"/>
+              </a:schemeClr>
+            </a:solidFill>
+            <a:miter lim="800000"/>
+          </a:ln>
+        </p:spPr>
+        <p:style>
+          <a:lnRef idx="1">
+            <a:schemeClr val="accent1"/>
+          </a:lnRef>
+          <a:fillRef idx="0">
+            <a:schemeClr val="accent1"/>
+          </a:fillRef>
+          <a:effectRef idx="0">
+            <a:schemeClr val="accent1"/>
+          </a:effectRef>
+          <a:fontRef idx="minor">
+            <a:schemeClr val="tx1"/>
+          </a:fontRef>
+        </p:style>
+      </p:cxnSp>
+      <p:sp>
+        <p:nvSpPr>
+          <p:cNvPr id="5" name="TextBox 4">
+            <a:extLst>
+              <a:ext uri="{FF2B5EF4-FFF2-40B4-BE49-F238E27FC236}">
+                <a16:creationId xmlns:a16="http://schemas.microsoft.com/office/drawing/2014/main" id="{7164DF05-C9D4-436A-AAA4-614E7E60D2AD}"/>
+              </a:ext>
+            </a:extLst>
+          </p:cNvPr>
+          <p:cNvSpPr txBox="1"/>
+          <p:nvPr/>
+        </p:nvSpPr>
+        <p:spPr>
+          <a:xfrm>
+            <a:off x="1154955" y="1266958"/>
+            <a:ext cx="2904124" cy="4528457"/>
+          </a:xfrm>
+          <a:prstGeom prst="rect">
+            <a:avLst/>
+          </a:prstGeom>
+        </p:spPr>
+        <p:txBody>
+          <a:bodyPr vert="horz" lIns="91440" tIns="45720" rIns="91440" bIns="45720" rtlCol="0" anchor="ctr">
+            <a:normAutofit/>
+          </a:bodyPr>
+          <a:lstStyle/>
+          <a:p>
+            <a:pPr algn="r">
+              <a:spcBef>
+                <a:spcPts val="1000"/>
+              </a:spcBef>
+              <a:buClr>
+                <a:schemeClr val="bg2">
+                  <a:lumMod val="40000"/>
+                  <a:lumOff val="60000"/>
+                </a:schemeClr>
+              </a:buClr>
+              <a:buSzPct val="80000"/>
+            </a:pPr>
+            <a:r>
+              <a:rPr lang="en-US" sz="2000" b="0" i="0" kern="1200" cap="all" dirty="0">
+                <a:solidFill>
+                  <a:schemeClr val="tx2"/>
+                </a:solidFill>
+                <a:latin typeface="+mj-lt"/>
+                <a:ea typeface="+mj-ea"/>
+                <a:cs typeface="+mj-cs"/>
+              </a:rPr>
+              <a:t>by</a:t>
+            </a:r>
+          </a:p>
+          <a:p>
+            <a:pPr algn="r">
+              <a:spcBef>
+                <a:spcPts val="1000"/>
+              </a:spcBef>
+              <a:buClr>
+                <a:schemeClr val="bg2">
+                  <a:lumMod val="40000"/>
+                  <a:lumOff val="60000"/>
+                </a:schemeClr>
+              </a:buClr>
+              <a:buSzPct val="80000"/>
+            </a:pPr>
+            <a:r>
+              <a:rPr lang="en-US" sz="2000" b="0" i="0" kern="1200" cap="all" dirty="0">
+                <a:solidFill>
+                  <a:schemeClr val="tx2"/>
+                </a:solidFill>
+                <a:latin typeface="+mj-lt"/>
+                <a:ea typeface="+mj-ea"/>
+                <a:cs typeface="+mj-cs"/>
+              </a:rPr>
+              <a:t> Shadi Jiha</a:t>
+            </a:r>
+          </a:p>
+          <a:p>
+            <a:pPr algn="r">
+              <a:spcBef>
+                <a:spcPts val="1000"/>
+              </a:spcBef>
+              <a:buClr>
+                <a:schemeClr val="bg2">
+                  <a:lumMod val="40000"/>
+                  <a:lumOff val="60000"/>
+                </a:schemeClr>
+              </a:buClr>
+              <a:buSzPct val="80000"/>
+            </a:pPr>
+            <a:r>
+              <a:rPr lang="en-US" sz="2000" b="0" i="0" kern="1200" cap="all" dirty="0">
+                <a:solidFill>
+                  <a:schemeClr val="tx2"/>
+                </a:solidFill>
+                <a:latin typeface="+mj-lt"/>
+                <a:ea typeface="+mj-ea"/>
+                <a:cs typeface="+mj-cs"/>
+              </a:rPr>
+              <a:t>Christina </a:t>
+            </a:r>
+            <a:r>
+              <a:rPr lang="en-US" sz="2000" b="0" i="0" kern="1200" cap="all" dirty="0" err="1">
+                <a:solidFill>
+                  <a:schemeClr val="tx2"/>
+                </a:solidFill>
+                <a:latin typeface="+mj-lt"/>
+                <a:ea typeface="+mj-ea"/>
+                <a:cs typeface="+mj-cs"/>
+              </a:rPr>
+              <a:t>Darstbanian</a:t>
+            </a:r>
+            <a:r>
+              <a:rPr lang="en-US" sz="2000" b="0" i="0" kern="1200" cap="all" dirty="0">
+                <a:solidFill>
+                  <a:schemeClr val="tx2"/>
+                </a:solidFill>
+                <a:latin typeface="+mj-lt"/>
+                <a:ea typeface="+mj-ea"/>
+                <a:cs typeface="+mj-cs"/>
+              </a:rPr>
+              <a:t> </a:t>
+            </a:r>
+          </a:p>
+        </p:txBody>
+      </p:sp>
       <p:sp>
         <p:nvSpPr>
           <p:cNvPr id="4" name="TextBox 3">
@@ -9741,74 +10454,37 @@
         </p:nvSpPr>
         <p:spPr>
           <a:xfrm>
-            <a:off x="2564266" y="2024743"/>
-            <a:ext cx="5330305" cy="784830"/>
+            <a:off x="4654295" y="1266958"/>
+            <a:ext cx="6808362" cy="4528457"/>
           </a:xfrm>
           <a:prstGeom prst="rect">
             <a:avLst/>
           </a:prstGeom>
-          <a:noFill/>
         </p:spPr>
         <p:txBody>
-          <a:bodyPr wrap="none" rtlCol="0">
-            <a:spAutoFit/>
+          <a:bodyPr vert="horz" lIns="91440" tIns="45720" rIns="91440" bIns="45720" rtlCol="0" anchor="ctr">
+            <a:normAutofit/>
           </a:bodyPr>
           <a:lstStyle/>
           <a:p>
-            <a:pPr algn="ctr"/>
-            <a:r>
-              <a:rPr lang="en-CA" sz="4500" dirty="0"/>
+            <a:pPr>
+              <a:spcBef>
+                <a:spcPct val="0"/>
+              </a:spcBef>
+              <a:spcAft>
+                <a:spcPts val="600"/>
+              </a:spcAft>
+            </a:pPr>
+            <a:r>
+              <a:rPr lang="en-US" sz="7200" b="0" i="0" kern="1200" dirty="0">
+                <a:solidFill>
+                  <a:schemeClr val="tx2"/>
+                </a:solidFill>
+                <a:latin typeface="+mj-lt"/>
+                <a:ea typeface="+mj-ea"/>
+                <a:cs typeface="+mj-cs"/>
+              </a:rPr>
               <a:t>Magic Voice App </a:t>
-            </a:r>
-          </a:p>
-        </p:txBody>
-      </p:sp>
-      <p:sp>
-        <p:nvSpPr>
-          <p:cNvPr id="5" name="TextBox 4">
-            <a:extLst>
-              <a:ext uri="{FF2B5EF4-FFF2-40B4-BE49-F238E27FC236}">
-                <a16:creationId xmlns:a16="http://schemas.microsoft.com/office/drawing/2014/main" id="{7164DF05-C9D4-436A-AAA4-614E7E60D2AD}"/>
-              </a:ext>
-            </a:extLst>
-          </p:cNvPr>
-          <p:cNvSpPr txBox="1"/>
-          <p:nvPr/>
-        </p:nvSpPr>
-        <p:spPr>
-          <a:xfrm>
-            <a:off x="2957803" y="4385388"/>
-            <a:ext cx="4543230" cy="1446550"/>
-          </a:xfrm>
-          <a:prstGeom prst="rect">
-            <a:avLst/>
-          </a:prstGeom>
-          <a:noFill/>
-        </p:spPr>
-        <p:txBody>
-          <a:bodyPr wrap="none" rtlCol="0">
-            <a:spAutoFit/>
-          </a:bodyPr>
-          <a:lstStyle/>
-          <a:p>
-            <a:pPr algn="ctr"/>
-            <a:r>
-              <a:rPr lang="en-CA" sz="2400" b="1" dirty="0"/>
-              <a:t>BY</a:t>
-            </a:r>
-          </a:p>
-          <a:p>
-            <a:pPr algn="ctr"/>
-            <a:r>
-              <a:rPr lang="en-CA" sz="3200" dirty="0"/>
-              <a:t> Shadi Jiha</a:t>
-            </a:r>
-          </a:p>
-          <a:p>
-            <a:pPr algn="ctr"/>
-            <a:r>
-              <a:rPr lang="en-CA" sz="3200" dirty="0"/>
-              <a:t>Christina Darstbanian </a:t>
             </a:r>
           </a:p>
         </p:txBody>
@@ -9827,6 +10503,129 @@
 </file>
 
 <file path=ppt/slides/slide10.xml><?xml version="1.0" encoding="utf-8"?>
+<p:sld xmlns:a="http://schemas.openxmlformats.org/drawingml/2006/main" xmlns:r="http://schemas.openxmlformats.org/officeDocument/2006/relationships" xmlns:p="http://schemas.openxmlformats.org/presentationml/2006/main">
+  <p:cSld>
+    <p:spTree>
+      <p:nvGrpSpPr>
+        <p:cNvPr id="1" name=""/>
+        <p:cNvGrpSpPr/>
+        <p:nvPr/>
+      </p:nvGrpSpPr>
+      <p:grpSpPr>
+        <a:xfrm>
+          <a:off x="0" y="0"/>
+          <a:ext cx="0" cy="0"/>
+          <a:chOff x="0" y="0"/>
+          <a:chExt cx="0" cy="0"/>
+        </a:xfrm>
+      </p:grpSpPr>
+      <p:sp>
+        <p:nvSpPr>
+          <p:cNvPr id="2" name="Title 1">
+            <a:extLst>
+              <a:ext uri="{FF2B5EF4-FFF2-40B4-BE49-F238E27FC236}">
+                <a16:creationId xmlns:a16="http://schemas.microsoft.com/office/drawing/2014/main" id="{740F2F40-34FC-48CC-B5B2-541CB03C939F}"/>
+              </a:ext>
+            </a:extLst>
+          </p:cNvPr>
+          <p:cNvSpPr>
+            <a:spLocks noGrp="1"/>
+          </p:cNvSpPr>
+          <p:nvPr>
+            <p:ph type="title"/>
+          </p:nvPr>
+        </p:nvSpPr>
+        <p:spPr/>
+        <p:txBody>
+          <a:bodyPr/>
+          <a:lstStyle/>
+          <a:p>
+            <a:r>
+              <a:rPr lang="en-US" dirty="0"/>
+              <a:t>Finding the right API for TTS		</a:t>
+            </a:r>
+          </a:p>
+        </p:txBody>
+      </p:sp>
+      <p:sp>
+        <p:nvSpPr>
+          <p:cNvPr id="3" name="Content Placeholder 2">
+            <a:extLst>
+              <a:ext uri="{FF2B5EF4-FFF2-40B4-BE49-F238E27FC236}">
+                <a16:creationId xmlns:a16="http://schemas.microsoft.com/office/drawing/2014/main" id="{73F86BA5-070C-4F42-88B3-EEE165E039CF}"/>
+              </a:ext>
+            </a:extLst>
+          </p:cNvPr>
+          <p:cNvSpPr>
+            <a:spLocks noGrp="1"/>
+          </p:cNvSpPr>
+          <p:nvPr>
+            <p:ph idx="1"/>
+          </p:nvPr>
+        </p:nvSpPr>
+        <p:spPr/>
+        <p:txBody>
+          <a:bodyPr/>
+          <a:lstStyle/>
+          <a:p>
+            <a:r>
+              <a:rPr lang="en-US" dirty="0"/>
+              <a:t>Challenges encountered</a:t>
+            </a:r>
+          </a:p>
+          <a:p>
+            <a:pPr lvl="1"/>
+            <a:r>
+              <a:rPr lang="en-US" dirty="0"/>
+              <a:t>Cost</a:t>
+            </a:r>
+          </a:p>
+          <a:p>
+            <a:pPr lvl="1"/>
+            <a:r>
+              <a:rPr lang="en-US" dirty="0"/>
+              <a:t>Request limit</a:t>
+            </a:r>
+          </a:p>
+          <a:p>
+            <a:endParaRPr lang="en-US" dirty="0"/>
+          </a:p>
+          <a:p>
+            <a:r>
+              <a:rPr lang="en-US" dirty="0"/>
+              <a:t>Stream elements:</a:t>
+            </a:r>
+          </a:p>
+          <a:p>
+            <a:pPr lvl="1"/>
+            <a:r>
+              <a:rPr lang="en-US" dirty="0"/>
+              <a:t>Free</a:t>
+            </a:r>
+          </a:p>
+          <a:p>
+            <a:pPr lvl="1"/>
+            <a:r>
+              <a:rPr lang="en-US" dirty="0"/>
+              <a:t>Enough requests per minute</a:t>
+            </a:r>
+          </a:p>
+        </p:txBody>
+      </p:sp>
+    </p:spTree>
+    <p:extLst>
+      <p:ext uri="{BB962C8B-B14F-4D97-AF65-F5344CB8AC3E}">
+        <p14:creationId xmlns:p14="http://schemas.microsoft.com/office/powerpoint/2010/main" val="2987991987"/>
+      </p:ext>
+    </p:extLst>
+  </p:cSld>
+  <p:clrMapOvr>
+    <a:masterClrMapping/>
+  </p:clrMapOvr>
+</p:sld>
+</file>
+
+<file path=ppt/slides/slide11.xml><?xml version="1.0" encoding="utf-8"?>
 <p:sld xmlns:a="http://schemas.openxmlformats.org/drawingml/2006/main" xmlns:r="http://schemas.openxmlformats.org/officeDocument/2006/relationships" xmlns:p="http://schemas.openxmlformats.org/presentationml/2006/main">
   <p:cSld>
     <p:bg>
@@ -9919,7 +10718,7 @@
             <p:ph idx="1"/>
             <p:extLst>
               <p:ext uri="{D42A27DB-BD31-4B8C-83A1-F6EECF244321}">
-                <p14:modId xmlns:p14="http://schemas.microsoft.com/office/powerpoint/2010/main" val="4072606705"/>
+                <p14:modId xmlns:p14="http://schemas.microsoft.com/office/powerpoint/2010/main" val="2321075344"/>
               </p:ext>
             </p:extLst>
           </p:nvPr>
@@ -9947,7 +10746,173 @@
 </p:sld>
 </file>
 
-<file path=ppt/slides/slide11.xml><?xml version="1.0" encoding="utf-8"?>
+<file path=ppt/slides/slide12.xml><?xml version="1.0" encoding="utf-8"?>
+<p:sld xmlns:a="http://schemas.openxmlformats.org/drawingml/2006/main" xmlns:r="http://schemas.openxmlformats.org/officeDocument/2006/relationships" xmlns:p="http://schemas.openxmlformats.org/presentationml/2006/main">
+  <p:cSld>
+    <p:bg>
+      <p:bgPr>
+        <a:blipFill rotWithShape="1">
+          <a:blip r:embed="rId2">
+            <a:duotone>
+              <a:schemeClr val="bg2">
+                <a:shade val="69000"/>
+                <a:hueMod val="108000"/>
+                <a:satMod val="164000"/>
+                <a:lumMod val="74000"/>
+              </a:schemeClr>
+              <a:schemeClr val="bg2">
+                <a:tint val="96000"/>
+                <a:hueMod val="88000"/>
+                <a:satMod val="140000"/>
+                <a:lumMod val="132000"/>
+              </a:schemeClr>
+            </a:duotone>
+          </a:blip>
+          <a:stretch/>
+        </a:blipFill>
+        <a:effectLst/>
+      </p:bgPr>
+    </p:bg>
+    <p:spTree>
+      <p:nvGrpSpPr>
+        <p:cNvPr id="1" name=""/>
+        <p:cNvGrpSpPr/>
+        <p:nvPr/>
+      </p:nvGrpSpPr>
+      <p:grpSpPr>
+        <a:xfrm>
+          <a:off x="0" y="0"/>
+          <a:ext cx="0" cy="0"/>
+          <a:chOff x="0" y="0"/>
+          <a:chExt cx="0" cy="0"/>
+        </a:xfrm>
+      </p:grpSpPr>
+      <p:sp>
+        <p:nvSpPr>
+          <p:cNvPr id="2" name="Title 1">
+            <a:extLst>
+              <a:ext uri="{FF2B5EF4-FFF2-40B4-BE49-F238E27FC236}">
+                <a16:creationId xmlns:a16="http://schemas.microsoft.com/office/drawing/2014/main" id="{62280E3E-4E27-4F79-B300-4BAACEDFAA85}"/>
+              </a:ext>
+            </a:extLst>
+          </p:cNvPr>
+          <p:cNvSpPr>
+            <a:spLocks noGrp="1"/>
+          </p:cNvSpPr>
+          <p:nvPr>
+            <p:ph type="title"/>
+          </p:nvPr>
+        </p:nvSpPr>
+        <p:spPr>
+          <a:xfrm>
+            <a:off x="7790541" y="1450259"/>
+            <a:ext cx="3753599" cy="1442153"/>
+          </a:xfrm>
+        </p:spPr>
+        <p:txBody>
+          <a:bodyPr>
+            <a:normAutofit/>
+          </a:bodyPr>
+          <a:lstStyle/>
+          <a:p>
+            <a:r>
+              <a:rPr lang="en-US" sz="3600"/>
+              <a:t>A peek of future API</a:t>
+            </a:r>
+          </a:p>
+        </p:txBody>
+      </p:sp>
+      <p:pic>
+        <p:nvPicPr>
+          <p:cNvPr id="7" name="Picture 6" descr="Text&#10;&#10;Description automatically generated">
+            <a:extLst>
+              <a:ext uri="{FF2B5EF4-FFF2-40B4-BE49-F238E27FC236}">
+                <a16:creationId xmlns:a16="http://schemas.microsoft.com/office/drawing/2014/main" id="{C512654A-0FFF-4C9B-A570-1D68D88A6DF6}"/>
+              </a:ext>
+            </a:extLst>
+          </p:cNvPr>
+          <p:cNvPicPr>
+            <a:picLocks noChangeAspect="1"/>
+          </p:cNvPicPr>
+          <p:nvPr/>
+        </p:nvPicPr>
+        <p:blipFill rotWithShape="1">
+          <a:blip r:embed="rId3"/>
+          <a:srcRect r="17923" b="1"/>
+          <a:stretch/>
+        </p:blipFill>
+        <p:spPr>
+          <a:xfrm>
+            <a:off x="646532" y="1447799"/>
+            <a:ext cx="6493910" cy="4572001"/>
+          </a:xfrm>
+          <a:prstGeom prst="rect">
+            <a:avLst/>
+          </a:prstGeom>
+          <a:effectLst>
+            <a:outerShdw blurRad="50800" dist="38100" dir="5400000" algn="t" rotWithShape="0">
+              <a:prstClr val="black">
+                <a:alpha val="43000"/>
+              </a:prstClr>
+            </a:outerShdw>
+          </a:effectLst>
+        </p:spPr>
+      </p:pic>
+      <p:sp>
+        <p:nvSpPr>
+          <p:cNvPr id="3" name="Content Placeholder 2">
+            <a:extLst>
+              <a:ext uri="{FF2B5EF4-FFF2-40B4-BE49-F238E27FC236}">
+                <a16:creationId xmlns:a16="http://schemas.microsoft.com/office/drawing/2014/main" id="{9EA849A3-B7CC-4B9B-B2CF-062802F5ADFA}"/>
+              </a:ext>
+            </a:extLst>
+          </p:cNvPr>
+          <p:cNvSpPr>
+            <a:spLocks noGrp="1"/>
+          </p:cNvSpPr>
+          <p:nvPr>
+            <p:ph idx="1"/>
+          </p:nvPr>
+        </p:nvSpPr>
+        <p:spPr>
+          <a:xfrm>
+            <a:off x="7789312" y="3072385"/>
+            <a:ext cx="3754987" cy="2947415"/>
+          </a:xfrm>
+        </p:spPr>
+        <p:txBody>
+          <a:bodyPr>
+            <a:normAutofit/>
+          </a:bodyPr>
+          <a:lstStyle/>
+          <a:p>
+            <a:r>
+              <a:rPr lang="en-US" sz="1800"/>
+              <a:t>The future API using callbacks can look like this</a:t>
+            </a:r>
+          </a:p>
+          <a:p>
+            <a:r>
+              <a:rPr lang="en-US" sz="1800"/>
+              <a:t>What we did was a prove of concept and can be transformed to a library</a:t>
+            </a:r>
+          </a:p>
+        </p:txBody>
+      </p:sp>
+    </p:spTree>
+    <p:extLst>
+      <p:ext uri="{BB962C8B-B14F-4D97-AF65-F5344CB8AC3E}">
+        <p14:creationId xmlns:p14="http://schemas.microsoft.com/office/powerpoint/2010/main" val="647103491"/>
+      </p:ext>
+    </p:extLst>
+  </p:cSld>
+  <p:clrMapOvr>
+    <a:masterClrMapping/>
+  </p:clrMapOvr>
+</p:sld>
+</file>
+
+<file path=ppt/slides/slide13.xml><?xml version="1.0" encoding="utf-8"?>
 <p:sld xmlns:a="http://schemas.openxmlformats.org/drawingml/2006/main" xmlns:r="http://schemas.openxmlformats.org/officeDocument/2006/relationships" xmlns:p="http://schemas.openxmlformats.org/presentationml/2006/main">
   <p:cSld>
     <p:spTree>
@@ -9969,7 +10934,7 @@
           <p:cNvPr id="2" name="Title 1">
             <a:extLst>
               <a:ext uri="{FF2B5EF4-FFF2-40B4-BE49-F238E27FC236}">
-                <a16:creationId xmlns:a16="http://schemas.microsoft.com/office/drawing/2014/main" id="{999DF481-54A9-4727-80E5-D9C4F3D0D4A2}"/>
+                <a16:creationId xmlns:a16="http://schemas.microsoft.com/office/drawing/2014/main" id="{8DF34279-E811-40EC-9632-2B8B78132527}"/>
               </a:ext>
             </a:extLst>
           </p:cNvPr>
@@ -9980,20 +10945,42 @@
             <p:ph type="title"/>
           </p:nvPr>
         </p:nvSpPr>
-        <p:spPr>
-          <a:xfrm>
-            <a:off x="2528596" y="2376739"/>
-            <a:ext cx="7134808" cy="2104522"/>
-          </a:xfrm>
-        </p:spPr>
+        <p:spPr/>
         <p:txBody>
           <a:bodyPr/>
           <a:lstStyle/>
           <a:p>
-            <a:pPr algn="ctr"/>
             <a:r>
               <a:rPr lang="en-US" dirty="0"/>
-              <a:t>Application presentation Time!</a:t>
+              <a:t>If the App was to be redone	</a:t>
+            </a:r>
+          </a:p>
+        </p:txBody>
+      </p:sp>
+      <p:sp>
+        <p:nvSpPr>
+          <p:cNvPr id="3" name="Content Placeholder 2">
+            <a:extLst>
+              <a:ext uri="{FF2B5EF4-FFF2-40B4-BE49-F238E27FC236}">
+                <a16:creationId xmlns:a16="http://schemas.microsoft.com/office/drawing/2014/main" id="{70DF8050-742A-42AE-8D9C-0FB468022D33}"/>
+              </a:ext>
+            </a:extLst>
+          </p:cNvPr>
+          <p:cNvSpPr>
+            <a:spLocks noGrp="1"/>
+          </p:cNvSpPr>
+          <p:nvPr>
+            <p:ph idx="1"/>
+          </p:nvPr>
+        </p:nvSpPr>
+        <p:spPr/>
+        <p:txBody>
+          <a:bodyPr/>
+          <a:lstStyle/>
+          <a:p>
+            <a:r>
+              <a:rPr lang="en-US" dirty="0"/>
+              <a:t>What technologies would I use instead and why (After app demo)</a:t>
             </a:r>
           </a:p>
         </p:txBody>
@@ -10001,7 +10988,173 @@
     </p:spTree>
     <p:extLst>
       <p:ext uri="{BB962C8B-B14F-4D97-AF65-F5344CB8AC3E}">
-        <p14:creationId xmlns:p14="http://schemas.microsoft.com/office/powerpoint/2010/main" val="3869855037"/>
+        <p14:creationId xmlns:p14="http://schemas.microsoft.com/office/powerpoint/2010/main" val="854007743"/>
+      </p:ext>
+    </p:extLst>
+  </p:cSld>
+  <p:clrMapOvr>
+    <a:masterClrMapping/>
+  </p:clrMapOvr>
+</p:sld>
+</file>
+
+<file path=ppt/slides/slide14.xml><?xml version="1.0" encoding="utf-8"?>
+<p:sld xmlns:a="http://schemas.openxmlformats.org/drawingml/2006/main" xmlns:r="http://schemas.openxmlformats.org/officeDocument/2006/relationships" xmlns:p="http://schemas.openxmlformats.org/presentationml/2006/main">
+  <p:cSld>
+    <p:spTree>
+      <p:nvGrpSpPr>
+        <p:cNvPr id="1" name=""/>
+        <p:cNvGrpSpPr/>
+        <p:nvPr/>
+      </p:nvGrpSpPr>
+      <p:grpSpPr>
+        <a:xfrm>
+          <a:off x="0" y="0"/>
+          <a:ext cx="0" cy="0"/>
+          <a:chOff x="0" y="0"/>
+          <a:chExt cx="0" cy="0"/>
+        </a:xfrm>
+      </p:grpSpPr>
+      <p:sp>
+        <p:nvSpPr>
+          <p:cNvPr id="2" name="Title 1">
+            <a:extLst>
+              <a:ext uri="{FF2B5EF4-FFF2-40B4-BE49-F238E27FC236}">
+                <a16:creationId xmlns:a16="http://schemas.microsoft.com/office/drawing/2014/main" id="{9C93F47C-B9AB-46BF-AE83-6F492C5B21DE}"/>
+              </a:ext>
+            </a:extLst>
+          </p:cNvPr>
+          <p:cNvSpPr>
+            <a:spLocks noGrp="1"/>
+          </p:cNvSpPr>
+          <p:nvPr>
+            <p:ph type="title"/>
+          </p:nvPr>
+        </p:nvSpPr>
+        <p:spPr/>
+        <p:txBody>
+          <a:bodyPr/>
+          <a:lstStyle/>
+          <a:p>
+            <a:r>
+              <a:rPr lang="en-US" dirty="0"/>
+              <a:t>Finally	</a:t>
+            </a:r>
+          </a:p>
+        </p:txBody>
+      </p:sp>
+      <p:sp>
+        <p:nvSpPr>
+          <p:cNvPr id="3" name="Content Placeholder 2">
+            <a:extLst>
+              <a:ext uri="{FF2B5EF4-FFF2-40B4-BE49-F238E27FC236}">
+                <a16:creationId xmlns:a16="http://schemas.microsoft.com/office/drawing/2014/main" id="{4A1F1F40-E765-4FE2-98DE-B009B737A14A}"/>
+              </a:ext>
+            </a:extLst>
+          </p:cNvPr>
+          <p:cNvSpPr>
+            <a:spLocks noGrp="1"/>
+          </p:cNvSpPr>
+          <p:nvPr>
+            <p:ph idx="1"/>
+          </p:nvPr>
+        </p:nvSpPr>
+        <p:spPr>
+          <a:xfrm>
+            <a:off x="1103312" y="1492898"/>
+            <a:ext cx="8946541" cy="4755501"/>
+          </a:xfrm>
+        </p:spPr>
+        <p:txBody>
+          <a:bodyPr/>
+          <a:lstStyle/>
+          <a:p>
+            <a:r>
+              <a:rPr lang="en-US" b="1" dirty="0"/>
+              <a:t>Shadi Jiha</a:t>
+            </a:r>
+            <a:r>
+              <a:rPr lang="en-US" dirty="0"/>
+              <a:t>: (contact: shadijiha@gmail.com)</a:t>
+            </a:r>
+          </a:p>
+          <a:p>
+            <a:pPr lvl="1"/>
+            <a:r>
+              <a:rPr lang="en-US" dirty="0"/>
+              <a:t>professional experience</a:t>
+            </a:r>
+          </a:p>
+          <a:p>
+            <a:pPr lvl="2"/>
+            <a:r>
+              <a:rPr lang="en-US" dirty="0"/>
+              <a:t>Social media manager at Bijouterie Hamel (2 years)</a:t>
+            </a:r>
+          </a:p>
+          <a:p>
+            <a:pPr lvl="2"/>
+            <a:r>
+              <a:rPr lang="en-US" dirty="0"/>
+              <a:t>Full stack intern at </a:t>
+            </a:r>
+            <a:r>
+              <a:rPr lang="en-US" dirty="0" err="1"/>
+              <a:t>TapMedical</a:t>
+            </a:r>
+            <a:r>
+              <a:rPr lang="en-US" dirty="0"/>
+              <a:t> Montreal (1 year)</a:t>
+            </a:r>
+          </a:p>
+          <a:p>
+            <a:pPr lvl="1"/>
+            <a:r>
+              <a:rPr lang="en-US" dirty="0"/>
+              <a:t>Personal projects</a:t>
+            </a:r>
+          </a:p>
+          <a:p>
+            <a:pPr lvl="2"/>
+            <a:r>
+              <a:rPr lang="en-US" dirty="0"/>
+              <a:t>Web dev: Made my own simpler version of “Google drive” (upload, create files) on my own Linux server.</a:t>
+            </a:r>
+          </a:p>
+          <a:p>
+            <a:pPr lvl="2"/>
+            <a:r>
+              <a:rPr lang="en-US" dirty="0"/>
+              <a:t>C++: Graphics with OpenGL (sort of a game engine)</a:t>
+            </a:r>
+          </a:p>
+          <a:p>
+            <a:pPr lvl="2"/>
+            <a:r>
+              <a:rPr lang="en-US" dirty="0"/>
+              <a:t>Java/C#: Created my own Compiler (my costume programming language)</a:t>
+            </a:r>
+          </a:p>
+          <a:p>
+            <a:pPr lvl="2"/>
+            <a:r>
+              <a:rPr lang="en-US" dirty="0"/>
+              <a:t>JS/TS: Created my own code editor</a:t>
+            </a:r>
+          </a:p>
+          <a:p>
+            <a:pPr lvl="2"/>
+            <a:r>
+              <a:rPr lang="en-US" dirty="0"/>
+              <a:t>Familiar with other languages although no significant projects</a:t>
+            </a:r>
+          </a:p>
+        </p:txBody>
+      </p:sp>
+    </p:spTree>
+    <p:extLst>
+      <p:ext uri="{BB962C8B-B14F-4D97-AF65-F5344CB8AC3E}">
+        <p14:creationId xmlns:p14="http://schemas.microsoft.com/office/powerpoint/2010/main" val="35627614"/>
       </p:ext>
     </p:extLst>
   </p:cSld>
@@ -10414,8 +11567,8 @@
         </p:blipFill>
         <p:spPr>
           <a:xfrm>
-            <a:off x="4351757" y="2118452"/>
-            <a:ext cx="7236542" cy="4416167"/>
+            <a:off x="4351757" y="2562896"/>
+            <a:ext cx="7236542" cy="3971723"/>
           </a:xfrm>
           <a:prstGeom prst="rect">
             <a:avLst/>
@@ -11641,6 +12794,18 @@
               <a:t>Bootstrap </a:t>
             </a:r>
           </a:p>
+          <a:p>
+            <a:endParaRPr lang="en-CA" dirty="0"/>
+          </a:p>
+          <a:p>
+            <a:pPr marL="0" indent="0">
+              <a:buNone/>
+            </a:pPr>
+            <a:r>
+              <a:rPr lang="en-CA" dirty="0"/>
+              <a:t>Not ideal by OK for proof of concept given the time frame</a:t>
+            </a:r>
+          </a:p>
         </p:txBody>
       </p:sp>
     </p:spTree>
@@ -11967,7 +13132,7 @@
           <p:cNvPr id="2" name="Title 1">
             <a:extLst>
               <a:ext uri="{FF2B5EF4-FFF2-40B4-BE49-F238E27FC236}">
-                <a16:creationId xmlns:a16="http://schemas.microsoft.com/office/drawing/2014/main" id="{740F2F40-34FC-48CC-B5B2-541CB03C939F}"/>
+                <a16:creationId xmlns:a16="http://schemas.microsoft.com/office/drawing/2014/main" id="{A8CF1419-0BCC-4FB3-8106-3CA5421B16BB}"/>
               </a:ext>
             </a:extLst>
           </p:cNvPr>
@@ -11985,7 +13150,7 @@
           <a:p>
             <a:r>
               <a:rPr lang="en-US" dirty="0"/>
-              <a:t>Finding the right API		</a:t>
+              <a:t>E-mail problems</a:t>
             </a:r>
           </a:p>
         </p:txBody>
@@ -11995,7 +13160,7 @@
           <p:cNvPr id="3" name="Content Placeholder 2">
             <a:extLst>
               <a:ext uri="{FF2B5EF4-FFF2-40B4-BE49-F238E27FC236}">
-                <a16:creationId xmlns:a16="http://schemas.microsoft.com/office/drawing/2014/main" id="{73F86BA5-070C-4F42-88B3-EEE165E039CF}"/>
+                <a16:creationId xmlns:a16="http://schemas.microsoft.com/office/drawing/2014/main" id="{5F3B107C-E803-4877-81CC-2EEC52AFBD9E}"/>
               </a:ext>
             </a:extLst>
           </p:cNvPr>
@@ -12013,44 +13178,19 @@
           <a:p>
             <a:r>
               <a:rPr lang="en-US" dirty="0"/>
-              <a:t>Challenges encountered</a:t>
-            </a:r>
-          </a:p>
-          <a:p>
-            <a:pPr lvl="1"/>
+              <a:t>Problems when user wants to enter his email (at keyword)</a:t>
+            </a:r>
+          </a:p>
+          <a:p>
             <a:r>
               <a:rPr lang="en-US" dirty="0"/>
-              <a:t>Cost</a:t>
-            </a:r>
-          </a:p>
-          <a:p>
-            <a:pPr lvl="1"/>
+              <a:t>When user says: “Enter X@Y.com in email”. The speech would yield “x at y dot com”</a:t>
+            </a:r>
+          </a:p>
+          <a:p>
             <a:r>
               <a:rPr lang="en-US" dirty="0"/>
-              <a:t>Request limit</a:t>
-            </a:r>
-          </a:p>
-          <a:p>
-            <a:endParaRPr lang="en-US" dirty="0"/>
-          </a:p>
-          <a:p>
-            <a:r>
-              <a:rPr lang="en-US" dirty="0"/>
-              <a:t>Stream elements:</a:t>
-            </a:r>
-          </a:p>
-          <a:p>
-            <a:pPr lvl="1"/>
-            <a:r>
-              <a:rPr lang="en-US" dirty="0"/>
-              <a:t>Free</a:t>
-            </a:r>
-          </a:p>
-          <a:p>
-            <a:pPr lvl="1"/>
-            <a:r>
-              <a:rPr lang="en-US" dirty="0"/>
-              <a:t>Enough requests per minute</a:t>
+              <a:t>So additional logic was necessary.</a:t>
             </a:r>
           </a:p>
         </p:txBody>
@@ -12058,7 +13198,7 @@
     </p:spTree>
     <p:extLst>
       <p:ext uri="{BB962C8B-B14F-4D97-AF65-F5344CB8AC3E}">
-        <p14:creationId xmlns:p14="http://schemas.microsoft.com/office/powerpoint/2010/main" val="2987991987"/>
+        <p14:creationId xmlns:p14="http://schemas.microsoft.com/office/powerpoint/2010/main" val="3674247762"/>
       </p:ext>
     </p:extLst>
   </p:cSld>

</xml_diff>

<commit_message>
Update Hackathon Shadi Christina.pptx
</commit_message>
<xml_diff>
--- a/Hackathon Shadi Christina.pptx
+++ b/Hackathon Shadi Christina.pptx
@@ -5,23 +5,24 @@
     <p:sldMasterId id="2147483660" r:id="rId1"/>
   </p:sldMasterIdLst>
   <p:notesMasterIdLst>
-    <p:notesMasterId r:id="rId16"/>
+    <p:notesMasterId r:id="rId17"/>
   </p:notesMasterIdLst>
   <p:sldIdLst>
     <p:sldId id="265" r:id="rId2"/>
     <p:sldId id="270" r:id="rId3"/>
-    <p:sldId id="257" r:id="rId4"/>
-    <p:sldId id="266" r:id="rId5"/>
-    <p:sldId id="267" r:id="rId6"/>
-    <p:sldId id="258" r:id="rId7"/>
-    <p:sldId id="271" r:id="rId8"/>
-    <p:sldId id="272" r:id="rId9"/>
-    <p:sldId id="276" r:id="rId10"/>
-    <p:sldId id="274" r:id="rId11"/>
-    <p:sldId id="273" r:id="rId12"/>
-    <p:sldId id="277" r:id="rId13"/>
-    <p:sldId id="278" r:id="rId14"/>
-    <p:sldId id="279" r:id="rId15"/>
+    <p:sldId id="280" r:id="rId4"/>
+    <p:sldId id="257" r:id="rId5"/>
+    <p:sldId id="266" r:id="rId6"/>
+    <p:sldId id="267" r:id="rId7"/>
+    <p:sldId id="258" r:id="rId8"/>
+    <p:sldId id="271" r:id="rId9"/>
+    <p:sldId id="272" r:id="rId10"/>
+    <p:sldId id="276" r:id="rId11"/>
+    <p:sldId id="274" r:id="rId12"/>
+    <p:sldId id="273" r:id="rId13"/>
+    <p:sldId id="277" r:id="rId14"/>
+    <p:sldId id="278" r:id="rId15"/>
+    <p:sldId id="279" r:id="rId16"/>
   </p:sldIdLst>
   <p:sldSz cx="12192000" cy="6858000"/>
   <p:notesSz cx="6858000" cy="9144000"/>
@@ -3555,7 +3556,10 @@
           <a:bodyPr/>
           <a:lstStyle/>
           <a:p>
-            <a:endParaRPr lang="en-US" dirty="0"/>
+            <a:r>
+              <a:rPr lang="en-US" dirty="0"/>
+              <a:t>* Lots of money to be made in that sector</a:t>
+            </a:r>
           </a:p>
         </p:txBody>
       </p:sp>
@@ -3576,7 +3580,7 @@
           <a:p>
             <a:fld id="{64466C76-0BFA-4C3A-8B74-37E61261B65A}" type="slidenum">
               <a:rPr lang="en-US" smtClean="0"/>
-              <a:t>6</a:t>
+              <a:t>3</a:t>
             </a:fld>
             <a:endParaRPr lang="en-US"/>
           </a:p>
@@ -3585,7 +3589,7 @@
     </p:spTree>
     <p:extLst>
       <p:ext uri="{BB962C8B-B14F-4D97-AF65-F5344CB8AC3E}">
-        <p14:creationId xmlns:p14="http://schemas.microsoft.com/office/powerpoint/2010/main" val="1029759099"/>
+        <p14:creationId xmlns:p14="http://schemas.microsoft.com/office/powerpoint/2010/main" val="1119184960"/>
       </p:ext>
     </p:extLst>
   </p:cSld>
@@ -3639,27 +3643,7 @@
           <a:bodyPr/>
           <a:lstStyle/>
           <a:p>
-            <a:pPr marL="0" marR="0" lvl="0" indent="0" algn="l" defTabSz="914400" rtl="0" eaLnBrk="1" fontAlgn="auto" latinLnBrk="0" hangingPunct="1">
-              <a:lnSpc>
-                <a:spcPct val="100000"/>
-              </a:lnSpc>
-              <a:spcBef>
-                <a:spcPts val="0"/>
-              </a:spcBef>
-              <a:spcAft>
-                <a:spcPts val="0"/>
-              </a:spcAft>
-              <a:buClrTx/>
-              <a:buSzTx/>
-              <a:buFontTx/>
-              <a:buNone/>
-              <a:tabLst/>
-              <a:defRPr/>
-            </a:pPr>
-            <a:r>
-              <a:rPr lang="en-US" dirty="0"/>
-              <a:t>* Hard to find correct choice API for text-to-speech</a:t>
-            </a:r>
+            <a:endParaRPr lang="en-US" dirty="0"/>
           </a:p>
         </p:txBody>
       </p:sp>
@@ -3680,7 +3664,7 @@
           <a:p>
             <a:fld id="{64466C76-0BFA-4C3A-8B74-37E61261B65A}" type="slidenum">
               <a:rPr lang="en-US" smtClean="0"/>
-              <a:t>10</a:t>
+              <a:t>7</a:t>
             </a:fld>
             <a:endParaRPr lang="en-US"/>
           </a:p>
@@ -3689,7 +3673,7 @@
     </p:spTree>
     <p:extLst>
       <p:ext uri="{BB962C8B-B14F-4D97-AF65-F5344CB8AC3E}">
-        <p14:creationId xmlns:p14="http://schemas.microsoft.com/office/powerpoint/2010/main" val="646747683"/>
+        <p14:creationId xmlns:p14="http://schemas.microsoft.com/office/powerpoint/2010/main" val="1029759099"/>
       </p:ext>
     </p:extLst>
   </p:cSld>
@@ -3762,15 +3746,90 @@
             </a:pPr>
             <a:r>
               <a:rPr lang="en-US" dirty="0"/>
-              <a:t>* it was really hard to design a full extendable and maintainable system that would work on any application.</a:t>
-            </a:r>
-          </a:p>
-          <a:p>
-            <a:r>
-              <a:rPr lang="en-US" dirty="0"/>
-              <a:t>*</a:t>
-            </a:r>
-          </a:p>
+              <a:t>* Hard to find correct choice API for text-to-speech</a:t>
+            </a:r>
+          </a:p>
+        </p:txBody>
+      </p:sp>
+      <p:sp>
+        <p:nvSpPr>
+          <p:cNvPr id="4" name="Slide Number Placeholder 3"/>
+          <p:cNvSpPr>
+            <a:spLocks noGrp="1"/>
+          </p:cNvSpPr>
+          <p:nvPr>
+            <p:ph type="sldNum" sz="quarter" idx="5"/>
+          </p:nvPr>
+        </p:nvSpPr>
+        <p:spPr/>
+        <p:txBody>
+          <a:bodyPr/>
+          <a:lstStyle/>
+          <a:p>
+            <a:fld id="{64466C76-0BFA-4C3A-8B74-37E61261B65A}" type="slidenum">
+              <a:rPr lang="en-US" smtClean="0"/>
+              <a:t>11</a:t>
+            </a:fld>
+            <a:endParaRPr lang="en-US"/>
+          </a:p>
+        </p:txBody>
+      </p:sp>
+    </p:spTree>
+    <p:extLst>
+      <p:ext uri="{BB962C8B-B14F-4D97-AF65-F5344CB8AC3E}">
+        <p14:creationId xmlns:p14="http://schemas.microsoft.com/office/powerpoint/2010/main" val="646747683"/>
+      </p:ext>
+    </p:extLst>
+  </p:cSld>
+  <p:clrMapOvr>
+    <a:masterClrMapping/>
+  </p:clrMapOvr>
+</p:notes>
+</file>
+
+<file path=ppt/notesSlides/notesSlide4.xml><?xml version="1.0" encoding="utf-8"?>
+<p:notes xmlns:a="http://schemas.openxmlformats.org/drawingml/2006/main" xmlns:r="http://schemas.openxmlformats.org/officeDocument/2006/relationships" xmlns:p="http://schemas.openxmlformats.org/presentationml/2006/main">
+  <p:cSld>
+    <p:spTree>
+      <p:nvGrpSpPr>
+        <p:cNvPr id="1" name=""/>
+        <p:cNvGrpSpPr/>
+        <p:nvPr/>
+      </p:nvGrpSpPr>
+      <p:grpSpPr>
+        <a:xfrm>
+          <a:off x="0" y="0"/>
+          <a:ext cx="0" cy="0"/>
+          <a:chOff x="0" y="0"/>
+          <a:chExt cx="0" cy="0"/>
+        </a:xfrm>
+      </p:grpSpPr>
+      <p:sp>
+        <p:nvSpPr>
+          <p:cNvPr id="2" name="Slide Image Placeholder 1"/>
+          <p:cNvSpPr>
+            <a:spLocks noGrp="1" noRot="1" noChangeAspect="1"/>
+          </p:cNvSpPr>
+          <p:nvPr>
+            <p:ph type="sldImg"/>
+          </p:nvPr>
+        </p:nvSpPr>
+        <p:spPr/>
+      </p:sp>
+      <p:sp>
+        <p:nvSpPr>
+          <p:cNvPr id="3" name="Notes Placeholder 2"/>
+          <p:cNvSpPr>
+            <a:spLocks noGrp="1"/>
+          </p:cNvSpPr>
+          <p:nvPr>
+            <p:ph type="body" idx="1"/>
+          </p:nvPr>
+        </p:nvSpPr>
+        <p:spPr/>
+        <p:txBody>
+          <a:bodyPr/>
+          <a:lstStyle/>
           <a:p>
             <a:pPr marL="0" marR="0" lvl="0" indent="0" algn="l" defTabSz="914400" rtl="0" eaLnBrk="1" fontAlgn="auto" latinLnBrk="0" hangingPunct="1">
               <a:lnSpc>
@@ -3791,6 +3850,35 @@
             </a:pPr>
             <a:r>
               <a:rPr lang="en-US" dirty="0"/>
+              <a:t>* it was really hard to design a full extendable and maintainable system that would work on any application.</a:t>
+            </a:r>
+          </a:p>
+          <a:p>
+            <a:r>
+              <a:rPr lang="en-US" dirty="0"/>
+              <a:t>*</a:t>
+            </a:r>
+          </a:p>
+          <a:p>
+            <a:pPr marL="0" marR="0" lvl="0" indent="0" algn="l" defTabSz="914400" rtl="0" eaLnBrk="1" fontAlgn="auto" latinLnBrk="0" hangingPunct="1">
+              <a:lnSpc>
+                <a:spcPct val="100000"/>
+              </a:lnSpc>
+              <a:spcBef>
+                <a:spcPts val="0"/>
+              </a:spcBef>
+              <a:spcAft>
+                <a:spcPts val="0"/>
+              </a:spcAft>
+              <a:buClrTx/>
+              <a:buSzTx/>
+              <a:buFontTx/>
+              <a:buNone/>
+              <a:tabLst/>
+              <a:defRPr/>
+            </a:pPr>
+            <a:r>
+              <a:rPr lang="en-US" dirty="0"/>
               <a:t>* It is easy to refactor the code to use some sort of Callback system. Which allows each application to define </a:t>
             </a:r>
           </a:p>
@@ -3816,7 +3904,7 @@
           <a:p>
             <a:fld id="{64466C76-0BFA-4C3A-8B74-37E61261B65A}" type="slidenum">
               <a:rPr lang="en-US" smtClean="0"/>
-              <a:t>11</a:t>
+              <a:t>12</a:t>
             </a:fld>
             <a:endParaRPr lang="en-US"/>
           </a:p>
@@ -10524,6 +10612,104 @@
           <p:cNvPr id="2" name="Title 1">
             <a:extLst>
               <a:ext uri="{FF2B5EF4-FFF2-40B4-BE49-F238E27FC236}">
+                <a16:creationId xmlns:a16="http://schemas.microsoft.com/office/drawing/2014/main" id="{A8CF1419-0BCC-4FB3-8106-3CA5421B16BB}"/>
+              </a:ext>
+            </a:extLst>
+          </p:cNvPr>
+          <p:cNvSpPr>
+            <a:spLocks noGrp="1"/>
+          </p:cNvSpPr>
+          <p:nvPr>
+            <p:ph type="title"/>
+          </p:nvPr>
+        </p:nvSpPr>
+        <p:spPr/>
+        <p:txBody>
+          <a:bodyPr/>
+          <a:lstStyle/>
+          <a:p>
+            <a:r>
+              <a:rPr lang="en-US" dirty="0"/>
+              <a:t>E-mail problems</a:t>
+            </a:r>
+          </a:p>
+        </p:txBody>
+      </p:sp>
+      <p:sp>
+        <p:nvSpPr>
+          <p:cNvPr id="3" name="Content Placeholder 2">
+            <a:extLst>
+              <a:ext uri="{FF2B5EF4-FFF2-40B4-BE49-F238E27FC236}">
+                <a16:creationId xmlns:a16="http://schemas.microsoft.com/office/drawing/2014/main" id="{5F3B107C-E803-4877-81CC-2EEC52AFBD9E}"/>
+              </a:ext>
+            </a:extLst>
+          </p:cNvPr>
+          <p:cNvSpPr>
+            <a:spLocks noGrp="1"/>
+          </p:cNvSpPr>
+          <p:nvPr>
+            <p:ph idx="1"/>
+          </p:nvPr>
+        </p:nvSpPr>
+        <p:spPr/>
+        <p:txBody>
+          <a:bodyPr/>
+          <a:lstStyle/>
+          <a:p>
+            <a:r>
+              <a:rPr lang="en-US" dirty="0"/>
+              <a:t>Problems when user wants to enter his email (at keyword)</a:t>
+            </a:r>
+          </a:p>
+          <a:p>
+            <a:r>
+              <a:rPr lang="en-US" dirty="0"/>
+              <a:t>When user says: “Enter X@Y.com in email”. The speech would yield “x at y dot com”</a:t>
+            </a:r>
+          </a:p>
+          <a:p>
+            <a:r>
+              <a:rPr lang="en-US" dirty="0"/>
+              <a:t>So additional logic was necessary.</a:t>
+            </a:r>
+          </a:p>
+        </p:txBody>
+      </p:sp>
+    </p:spTree>
+    <p:extLst>
+      <p:ext uri="{BB962C8B-B14F-4D97-AF65-F5344CB8AC3E}">
+        <p14:creationId xmlns:p14="http://schemas.microsoft.com/office/powerpoint/2010/main" val="3674247762"/>
+      </p:ext>
+    </p:extLst>
+  </p:cSld>
+  <p:clrMapOvr>
+    <a:masterClrMapping/>
+  </p:clrMapOvr>
+</p:sld>
+</file>
+
+<file path=ppt/slides/slide11.xml><?xml version="1.0" encoding="utf-8"?>
+<p:sld xmlns:a="http://schemas.openxmlformats.org/drawingml/2006/main" xmlns:r="http://schemas.openxmlformats.org/officeDocument/2006/relationships" xmlns:p="http://schemas.openxmlformats.org/presentationml/2006/main">
+  <p:cSld>
+    <p:spTree>
+      <p:nvGrpSpPr>
+        <p:cNvPr id="1" name=""/>
+        <p:cNvGrpSpPr/>
+        <p:nvPr/>
+      </p:nvGrpSpPr>
+      <p:grpSpPr>
+        <a:xfrm>
+          <a:off x="0" y="0"/>
+          <a:ext cx="0" cy="0"/>
+          <a:chOff x="0" y="0"/>
+          <a:chExt cx="0" cy="0"/>
+        </a:xfrm>
+      </p:grpSpPr>
+      <p:sp>
+        <p:nvSpPr>
+          <p:cNvPr id="2" name="Title 1">
+            <a:extLst>
+              <a:ext uri="{FF2B5EF4-FFF2-40B4-BE49-F238E27FC236}">
                 <a16:creationId xmlns:a16="http://schemas.microsoft.com/office/drawing/2014/main" id="{740F2F40-34FC-48CC-B5B2-541CB03C939F}"/>
               </a:ext>
             </a:extLst>
@@ -10625,7 +10811,7 @@
 </p:sld>
 </file>
 
-<file path=ppt/slides/slide11.xml><?xml version="1.0" encoding="utf-8"?>
+<file path=ppt/slides/slide12.xml><?xml version="1.0" encoding="utf-8"?>
 <p:sld xmlns:a="http://schemas.openxmlformats.org/drawingml/2006/main" xmlns:r="http://schemas.openxmlformats.org/officeDocument/2006/relationships" xmlns:p="http://schemas.openxmlformats.org/presentationml/2006/main">
   <p:cSld>
     <p:bg>
@@ -10746,7 +10932,7 @@
 </p:sld>
 </file>
 
-<file path=ppt/slides/slide12.xml><?xml version="1.0" encoding="utf-8"?>
+<file path=ppt/slides/slide13.xml><?xml version="1.0" encoding="utf-8"?>
 <p:sld xmlns:a="http://schemas.openxmlformats.org/drawingml/2006/main" xmlns:r="http://schemas.openxmlformats.org/officeDocument/2006/relationships" xmlns:p="http://schemas.openxmlformats.org/presentationml/2006/main">
   <p:cSld>
     <p:bg>
@@ -10912,7 +11098,7 @@
 </p:sld>
 </file>
 
-<file path=ppt/slides/slide13.xml><?xml version="1.0" encoding="utf-8"?>
+<file path=ppt/slides/slide14.xml><?xml version="1.0" encoding="utf-8"?>
 <p:sld xmlns:a="http://schemas.openxmlformats.org/drawingml/2006/main" xmlns:r="http://schemas.openxmlformats.org/officeDocument/2006/relationships" xmlns:p="http://schemas.openxmlformats.org/presentationml/2006/main">
   <p:cSld>
     <p:spTree>
@@ -10998,7 +11184,7 @@
 </p:sld>
 </file>
 
-<file path=ppt/slides/slide14.xml><?xml version="1.0" encoding="utf-8"?>
+<file path=ppt/slides/slide15.xml><?xml version="1.0" encoding="utf-8"?>
 <p:sld xmlns:a="http://schemas.openxmlformats.org/drawingml/2006/main" xmlns:r="http://schemas.openxmlformats.org/officeDocument/2006/relationships" xmlns:p="http://schemas.openxmlformats.org/presentationml/2006/main">
   <p:cSld>
     <p:spTree>
@@ -11322,6 +11508,109 @@
           <p:cNvPr id="2" name="Title 1">
             <a:extLst>
               <a:ext uri="{FF2B5EF4-FFF2-40B4-BE49-F238E27FC236}">
+                <a16:creationId xmlns:a16="http://schemas.microsoft.com/office/drawing/2014/main" id="{F75972E2-D792-4228-99D6-EE35E66443FA}"/>
+              </a:ext>
+            </a:extLst>
+          </p:cNvPr>
+          <p:cNvSpPr>
+            <a:spLocks noGrp="1"/>
+          </p:cNvSpPr>
+          <p:nvPr>
+            <p:ph type="title"/>
+          </p:nvPr>
+        </p:nvSpPr>
+        <p:spPr/>
+        <p:txBody>
+          <a:bodyPr/>
+          <a:lstStyle/>
+          <a:p>
+            <a:r>
+              <a:rPr lang="en-US" dirty="0"/>
+              <a:t>Talking Business!	</a:t>
+            </a:r>
+          </a:p>
+        </p:txBody>
+      </p:sp>
+      <p:sp>
+        <p:nvSpPr>
+          <p:cNvPr id="3" name="Content Placeholder 2">
+            <a:extLst>
+              <a:ext uri="{FF2B5EF4-FFF2-40B4-BE49-F238E27FC236}">
+                <a16:creationId xmlns:a16="http://schemas.microsoft.com/office/drawing/2014/main" id="{7E136022-0C87-4CC7-B62B-48B86D7B40DB}"/>
+              </a:ext>
+            </a:extLst>
+          </p:cNvPr>
+          <p:cNvSpPr>
+            <a:spLocks noGrp="1"/>
+          </p:cNvSpPr>
+          <p:nvPr>
+            <p:ph idx="1"/>
+          </p:nvPr>
+        </p:nvSpPr>
+        <p:spPr/>
+        <p:txBody>
+          <a:bodyPr/>
+          <a:lstStyle/>
+          <a:p>
+            <a:r>
+              <a:rPr lang="en-US" dirty="0"/>
+              <a:t>Voice technologies are still relatively ne</a:t>
+            </a:r>
+          </a:p>
+          <a:p>
+            <a:r>
+              <a:rPr lang="en-US" dirty="0"/>
+              <a:t>Lots of investments in that sector</a:t>
+            </a:r>
+          </a:p>
+          <a:p>
+            <a:r>
+              <a:rPr lang="en-US" dirty="0"/>
+              <a:t>Voice driven apps help in lots of ways. Example: </a:t>
+            </a:r>
+            <a:r>
+              <a:rPr lang="en-US"/>
+              <a:t>blind people</a:t>
+            </a:r>
+            <a:endParaRPr lang="en-US" dirty="0"/>
+          </a:p>
+        </p:txBody>
+      </p:sp>
+    </p:spTree>
+    <p:extLst>
+      <p:ext uri="{BB962C8B-B14F-4D97-AF65-F5344CB8AC3E}">
+        <p14:creationId xmlns:p14="http://schemas.microsoft.com/office/powerpoint/2010/main" val="3995735135"/>
+      </p:ext>
+    </p:extLst>
+  </p:cSld>
+  <p:clrMapOvr>
+    <a:masterClrMapping/>
+  </p:clrMapOvr>
+</p:sld>
+</file>
+
+<file path=ppt/slides/slide4.xml><?xml version="1.0" encoding="utf-8"?>
+<p:sld xmlns:a="http://schemas.openxmlformats.org/drawingml/2006/main" xmlns:r="http://schemas.openxmlformats.org/officeDocument/2006/relationships" xmlns:p="http://schemas.openxmlformats.org/presentationml/2006/main">
+  <p:cSld>
+    <p:spTree>
+      <p:nvGrpSpPr>
+        <p:cNvPr id="1" name=""/>
+        <p:cNvGrpSpPr/>
+        <p:nvPr/>
+      </p:nvGrpSpPr>
+      <p:grpSpPr>
+        <a:xfrm>
+          <a:off x="0" y="0"/>
+          <a:ext cx="0" cy="0"/>
+          <a:chOff x="0" y="0"/>
+          <a:chExt cx="0" cy="0"/>
+        </a:xfrm>
+      </p:grpSpPr>
+      <p:sp>
+        <p:nvSpPr>
+          <p:cNvPr id="2" name="Title 1">
+            <a:extLst>
+              <a:ext uri="{FF2B5EF4-FFF2-40B4-BE49-F238E27FC236}">
                 <a16:creationId xmlns:a16="http://schemas.microsoft.com/office/drawing/2014/main" id="{9A4B7AE9-D134-4293-8F41-59ED3692E621}"/>
               </a:ext>
             </a:extLst>
@@ -11446,7 +11735,7 @@
 </p:sld>
 </file>
 
-<file path=ppt/slides/slide4.xml><?xml version="1.0" encoding="utf-8"?>
+<file path=ppt/slides/slide5.xml><?xml version="1.0" encoding="utf-8"?>
 <p:sld xmlns:a="http://schemas.openxmlformats.org/drawingml/2006/main" xmlns:r="http://schemas.openxmlformats.org/officeDocument/2006/relationships" xmlns:p="http://schemas.openxmlformats.org/presentationml/2006/main">
   <p:cSld>
     <p:spTree>
@@ -11588,7 +11877,7 @@
 </p:sld>
 </file>
 
-<file path=ppt/slides/slide5.xml><?xml version="1.0" encoding="utf-8"?>
+<file path=ppt/slides/slide6.xml><?xml version="1.0" encoding="utf-8"?>
 <p:sld xmlns:a="http://schemas.openxmlformats.org/drawingml/2006/main" xmlns:r="http://schemas.openxmlformats.org/officeDocument/2006/relationships" xmlns:p="http://schemas.openxmlformats.org/presentationml/2006/main">
   <p:cSld>
     <p:bg>
@@ -12687,7 +12976,7 @@
 </p:sld>
 </file>
 
-<file path=ppt/slides/slide6.xml><?xml version="1.0" encoding="utf-8"?>
+<file path=ppt/slides/slide7.xml><?xml version="1.0" encoding="utf-8"?>
 <p:sld xmlns:a="http://schemas.openxmlformats.org/drawingml/2006/main" xmlns:r="http://schemas.openxmlformats.org/officeDocument/2006/relationships" xmlns:p="http://schemas.openxmlformats.org/presentationml/2006/main">
   <p:cSld>
     <p:spTree>
@@ -12821,7 +13110,7 @@
 </p:sld>
 </file>
 
-<file path=ppt/slides/slide7.xml><?xml version="1.0" encoding="utf-8"?>
+<file path=ppt/slides/slide8.xml><?xml version="1.0" encoding="utf-8"?>
 <p:sld xmlns:a="http://schemas.openxmlformats.org/drawingml/2006/main" xmlns:r="http://schemas.openxmlformats.org/officeDocument/2006/relationships" xmlns:p="http://schemas.openxmlformats.org/presentationml/2006/main">
   <p:cSld>
     <p:spTree>
@@ -12937,7 +13226,7 @@
 </p:sld>
 </file>
 
-<file path=ppt/slides/slide8.xml><?xml version="1.0" encoding="utf-8"?>
+<file path=ppt/slides/slide9.xml><?xml version="1.0" encoding="utf-8"?>
 <p:sld xmlns:a="http://schemas.openxmlformats.org/drawingml/2006/main" xmlns:r="http://schemas.openxmlformats.org/officeDocument/2006/relationships" xmlns:p="http://schemas.openxmlformats.org/presentationml/2006/main">
   <p:cSld>
     <p:bg>
@@ -13101,104 +13390,6 @@
     <p:extLst>
       <p:ext uri="{BB962C8B-B14F-4D97-AF65-F5344CB8AC3E}">
         <p14:creationId xmlns:p14="http://schemas.microsoft.com/office/powerpoint/2010/main" val="591777743"/>
-      </p:ext>
-    </p:extLst>
-  </p:cSld>
-  <p:clrMapOvr>
-    <a:masterClrMapping/>
-  </p:clrMapOvr>
-</p:sld>
-</file>
-
-<file path=ppt/slides/slide9.xml><?xml version="1.0" encoding="utf-8"?>
-<p:sld xmlns:a="http://schemas.openxmlformats.org/drawingml/2006/main" xmlns:r="http://schemas.openxmlformats.org/officeDocument/2006/relationships" xmlns:p="http://schemas.openxmlformats.org/presentationml/2006/main">
-  <p:cSld>
-    <p:spTree>
-      <p:nvGrpSpPr>
-        <p:cNvPr id="1" name=""/>
-        <p:cNvGrpSpPr/>
-        <p:nvPr/>
-      </p:nvGrpSpPr>
-      <p:grpSpPr>
-        <a:xfrm>
-          <a:off x="0" y="0"/>
-          <a:ext cx="0" cy="0"/>
-          <a:chOff x="0" y="0"/>
-          <a:chExt cx="0" cy="0"/>
-        </a:xfrm>
-      </p:grpSpPr>
-      <p:sp>
-        <p:nvSpPr>
-          <p:cNvPr id="2" name="Title 1">
-            <a:extLst>
-              <a:ext uri="{FF2B5EF4-FFF2-40B4-BE49-F238E27FC236}">
-                <a16:creationId xmlns:a16="http://schemas.microsoft.com/office/drawing/2014/main" id="{A8CF1419-0BCC-4FB3-8106-3CA5421B16BB}"/>
-              </a:ext>
-            </a:extLst>
-          </p:cNvPr>
-          <p:cNvSpPr>
-            <a:spLocks noGrp="1"/>
-          </p:cNvSpPr>
-          <p:nvPr>
-            <p:ph type="title"/>
-          </p:nvPr>
-        </p:nvSpPr>
-        <p:spPr/>
-        <p:txBody>
-          <a:bodyPr/>
-          <a:lstStyle/>
-          <a:p>
-            <a:r>
-              <a:rPr lang="en-US" dirty="0"/>
-              <a:t>E-mail problems</a:t>
-            </a:r>
-          </a:p>
-        </p:txBody>
-      </p:sp>
-      <p:sp>
-        <p:nvSpPr>
-          <p:cNvPr id="3" name="Content Placeholder 2">
-            <a:extLst>
-              <a:ext uri="{FF2B5EF4-FFF2-40B4-BE49-F238E27FC236}">
-                <a16:creationId xmlns:a16="http://schemas.microsoft.com/office/drawing/2014/main" id="{5F3B107C-E803-4877-81CC-2EEC52AFBD9E}"/>
-              </a:ext>
-            </a:extLst>
-          </p:cNvPr>
-          <p:cNvSpPr>
-            <a:spLocks noGrp="1"/>
-          </p:cNvSpPr>
-          <p:nvPr>
-            <p:ph idx="1"/>
-          </p:nvPr>
-        </p:nvSpPr>
-        <p:spPr/>
-        <p:txBody>
-          <a:bodyPr/>
-          <a:lstStyle/>
-          <a:p>
-            <a:r>
-              <a:rPr lang="en-US" dirty="0"/>
-              <a:t>Problems when user wants to enter his email (at keyword)</a:t>
-            </a:r>
-          </a:p>
-          <a:p>
-            <a:r>
-              <a:rPr lang="en-US" dirty="0"/>
-              <a:t>When user says: “Enter X@Y.com in email”. The speech would yield “x at y dot com”</a:t>
-            </a:r>
-          </a:p>
-          <a:p>
-            <a:r>
-              <a:rPr lang="en-US" dirty="0"/>
-              <a:t>So additional logic was necessary.</a:t>
-            </a:r>
-          </a:p>
-        </p:txBody>
-      </p:sp>
-    </p:spTree>
-    <p:extLst>
-      <p:ext uri="{BB962C8B-B14F-4D97-AF65-F5344CB8AC3E}">
-        <p14:creationId xmlns:p14="http://schemas.microsoft.com/office/powerpoint/2010/main" val="3674247762"/>
       </p:ext>
     </p:extLst>
   </p:cSld>

</xml_diff>